<commit_message>
remove extra slide from powerpoint
</commit_message>
<xml_diff>
--- a/Docker on Windows.pptx
+++ b/Docker on Windows.pptx
@@ -12,14 +12,13 @@
     <p:sldId id="258" r:id="rId6"/>
     <p:sldId id="259" r:id="rId7"/>
     <p:sldId id="263" r:id="rId8"/>
-    <p:sldId id="268" r:id="rId9"/>
-    <p:sldId id="262" r:id="rId10"/>
-    <p:sldId id="270" r:id="rId11"/>
-    <p:sldId id="261" r:id="rId12"/>
-    <p:sldId id="260" r:id="rId13"/>
-    <p:sldId id="271" r:id="rId14"/>
-    <p:sldId id="266" r:id="rId15"/>
-    <p:sldId id="272" r:id="rId16"/>
+    <p:sldId id="262" r:id="rId9"/>
+    <p:sldId id="270" r:id="rId10"/>
+    <p:sldId id="261" r:id="rId11"/>
+    <p:sldId id="260" r:id="rId12"/>
+    <p:sldId id="271" r:id="rId13"/>
+    <p:sldId id="266" r:id="rId14"/>
+    <p:sldId id="272" r:id="rId15"/>
   </p:sldIdLst>
   <p:sldSz cx="12192000" cy="6858000"/>
   <p:notesSz cx="6858000" cy="9144000"/>
@@ -176,7 +175,7 @@
           <a:noFill/>
           <a:extLst>
             <a:ext uri="{909E8E84-426E-40dd-AFC4-6F175D3DCCD1}">
-              <a14:hiddenFill xmlns:a14="http://schemas.microsoft.com/office/drawing/2010/main" xmlns="">
+              <a14:hiddenFill xmlns="" xmlns:a14="http://schemas.microsoft.com/office/drawing/2010/main">
                 <a:solidFill>
                   <a:srgbClr val="FFFFFF"/>
                 </a:solidFill>
@@ -236,7 +235,7 @@
             </a:ln>
             <a:extLst>
               <a:ext uri="{91240B29-F687-4f45-9708-019B960494DF}">
-                <a14:hiddenLine xmlns:a14="http://schemas.microsoft.com/office/drawing/2010/main" xmlns="" w="9525">
+                <a14:hiddenLine xmlns="" xmlns:a14="http://schemas.microsoft.com/office/drawing/2010/main" w="9525">
                   <a:solidFill>
                     <a:srgbClr val="000000"/>
                   </a:solidFill>
@@ -326,7 +325,7 @@
             </a:ln>
             <a:extLst>
               <a:ext uri="{91240B29-F687-4f45-9708-019B960494DF}">
-                <a14:hiddenLine xmlns:a14="http://schemas.microsoft.com/office/drawing/2010/main" xmlns="" w="9525">
+                <a14:hiddenLine xmlns="" xmlns:a14="http://schemas.microsoft.com/office/drawing/2010/main" w="9525">
                   <a:solidFill>
                     <a:srgbClr val="000000"/>
                   </a:solidFill>
@@ -416,7 +415,7 @@
             </a:ln>
             <a:extLst>
               <a:ext uri="{91240B29-F687-4f45-9708-019B960494DF}">
-                <a14:hiddenLine xmlns:a14="http://schemas.microsoft.com/office/drawing/2010/main" xmlns="" w="9525">
+                <a14:hiddenLine xmlns="" xmlns:a14="http://schemas.microsoft.com/office/drawing/2010/main" w="9525">
                   <a:solidFill>
                     <a:srgbClr val="000000"/>
                   </a:solidFill>
@@ -450,7 +449,7 @@
             </a:ln>
             <a:extLst>
               <a:ext uri="{91240B29-F687-4f45-9708-019B960494DF}">
-                <a14:hiddenLine xmlns:a14="http://schemas.microsoft.com/office/drawing/2010/main" xmlns="" w="9525">
+                <a14:hiddenLine xmlns="" xmlns:a14="http://schemas.microsoft.com/office/drawing/2010/main" w="9525">
                   <a:solidFill>
                     <a:srgbClr val="000000"/>
                   </a:solidFill>
@@ -540,7 +539,7 @@
             </a:ln>
             <a:extLst>
               <a:ext uri="{91240B29-F687-4f45-9708-019B960494DF}">
-                <a14:hiddenLine xmlns:a14="http://schemas.microsoft.com/office/drawing/2010/main" xmlns="" w="9525">
+                <a14:hiddenLine xmlns="" xmlns:a14="http://schemas.microsoft.com/office/drawing/2010/main" w="9525">
                   <a:solidFill>
                     <a:srgbClr val="000000"/>
                   </a:solidFill>
@@ -602,7 +601,7 @@
             </a:ln>
             <a:extLst>
               <a:ext uri="{91240B29-F687-4f45-9708-019B960494DF}">
-                <a14:hiddenLine xmlns:a14="http://schemas.microsoft.com/office/drawing/2010/main" xmlns="" w="9525">
+                <a14:hiddenLine xmlns="" xmlns:a14="http://schemas.microsoft.com/office/drawing/2010/main" w="9525">
                   <a:solidFill>
                     <a:srgbClr val="000000"/>
                   </a:solidFill>
@@ -664,7 +663,7 @@
             </a:ln>
             <a:extLst>
               <a:ext uri="{91240B29-F687-4f45-9708-019B960494DF}">
-                <a14:hiddenLine xmlns:a14="http://schemas.microsoft.com/office/drawing/2010/main" xmlns="" w="9525">
+                <a14:hiddenLine xmlns="" xmlns:a14="http://schemas.microsoft.com/office/drawing/2010/main" w="9525">
                   <a:solidFill>
                     <a:srgbClr val="000000"/>
                   </a:solidFill>
@@ -754,7 +753,7 @@
             </a:ln>
             <a:extLst>
               <a:ext uri="{91240B29-F687-4f45-9708-019B960494DF}">
-                <a14:hiddenLine xmlns:a14="http://schemas.microsoft.com/office/drawing/2010/main" xmlns="" w="9525">
+                <a14:hiddenLine xmlns="" xmlns:a14="http://schemas.microsoft.com/office/drawing/2010/main" w="9525">
                   <a:solidFill>
                     <a:srgbClr val="000000"/>
                   </a:solidFill>
@@ -816,7 +815,7 @@
             </a:ln>
             <a:extLst>
               <a:ext uri="{91240B29-F687-4f45-9708-019B960494DF}">
-                <a14:hiddenLine xmlns:a14="http://schemas.microsoft.com/office/drawing/2010/main" xmlns="" w="9525">
+                <a14:hiddenLine xmlns="" xmlns:a14="http://schemas.microsoft.com/office/drawing/2010/main" w="9525">
                   <a:solidFill>
                     <a:srgbClr val="000000"/>
                   </a:solidFill>
@@ -878,7 +877,7 @@
             </a:ln>
             <a:extLst>
               <a:ext uri="{91240B29-F687-4f45-9708-019B960494DF}">
-                <a14:hiddenLine xmlns:a14="http://schemas.microsoft.com/office/drawing/2010/main" xmlns="" w="9525">
+                <a14:hiddenLine xmlns="" xmlns:a14="http://schemas.microsoft.com/office/drawing/2010/main" w="9525">
                   <a:solidFill>
                     <a:srgbClr val="000000"/>
                   </a:solidFill>
@@ -968,7 +967,7 @@
             </a:ln>
             <a:extLst>
               <a:ext uri="{91240B29-F687-4f45-9708-019B960494DF}">
-                <a14:hiddenLine xmlns:a14="http://schemas.microsoft.com/office/drawing/2010/main" xmlns="" w="9525">
+                <a14:hiddenLine xmlns="" xmlns:a14="http://schemas.microsoft.com/office/drawing/2010/main" w="9525">
                   <a:solidFill>
                     <a:srgbClr val="000000"/>
                   </a:solidFill>
@@ -1058,7 +1057,7 @@
             </a:ln>
             <a:extLst>
               <a:ext uri="{91240B29-F687-4f45-9708-019B960494DF}">
-                <a14:hiddenLine xmlns:a14="http://schemas.microsoft.com/office/drawing/2010/main" xmlns="" w="9525">
+                <a14:hiddenLine xmlns="" xmlns:a14="http://schemas.microsoft.com/office/drawing/2010/main" w="9525">
                   <a:solidFill>
                     <a:srgbClr val="000000"/>
                   </a:solidFill>
@@ -1120,7 +1119,7 @@
             </a:ln>
             <a:extLst>
               <a:ext uri="{91240B29-F687-4f45-9708-019B960494DF}">
-                <a14:hiddenLine xmlns:a14="http://schemas.microsoft.com/office/drawing/2010/main" xmlns="" w="9525">
+                <a14:hiddenLine xmlns="" xmlns:a14="http://schemas.microsoft.com/office/drawing/2010/main" w="9525">
                   <a:solidFill>
                     <a:srgbClr val="000000"/>
                   </a:solidFill>
@@ -1230,7 +1229,7 @@
             </a:ln>
             <a:extLst>
               <a:ext uri="{91240B29-F687-4f45-9708-019B960494DF}">
-                <a14:hiddenLine xmlns:a14="http://schemas.microsoft.com/office/drawing/2010/main" xmlns="" w="9525">
+                <a14:hiddenLine xmlns="" xmlns:a14="http://schemas.microsoft.com/office/drawing/2010/main" w="9525">
                   <a:solidFill>
                     <a:srgbClr val="000000"/>
                   </a:solidFill>
@@ -1292,7 +1291,7 @@
             </a:ln>
             <a:extLst>
               <a:ext uri="{91240B29-F687-4f45-9708-019B960494DF}">
-                <a14:hiddenLine xmlns:a14="http://schemas.microsoft.com/office/drawing/2010/main" xmlns="" w="9525">
+                <a14:hiddenLine xmlns="" xmlns:a14="http://schemas.microsoft.com/office/drawing/2010/main" w="9525">
                   <a:solidFill>
                     <a:srgbClr val="000000"/>
                   </a:solidFill>
@@ -1382,7 +1381,7 @@
             </a:ln>
             <a:extLst>
               <a:ext uri="{91240B29-F687-4f45-9708-019B960494DF}">
-                <a14:hiddenLine xmlns:a14="http://schemas.microsoft.com/office/drawing/2010/main" xmlns="" w="9525">
+                <a14:hiddenLine xmlns="" xmlns:a14="http://schemas.microsoft.com/office/drawing/2010/main" w="9525">
                   <a:solidFill>
                     <a:srgbClr val="000000"/>
                   </a:solidFill>
@@ -1472,7 +1471,7 @@
             </a:ln>
             <a:extLst>
               <a:ext uri="{91240B29-F687-4f45-9708-019B960494DF}">
-                <a14:hiddenLine xmlns:a14="http://schemas.microsoft.com/office/drawing/2010/main" xmlns="" w="9525">
+                <a14:hiddenLine xmlns="" xmlns:a14="http://schemas.microsoft.com/office/drawing/2010/main" w="9525">
                   <a:solidFill>
                     <a:srgbClr val="000000"/>
                   </a:solidFill>
@@ -1534,7 +1533,7 @@
             </a:ln>
             <a:extLst>
               <a:ext uri="{91240B29-F687-4f45-9708-019B960494DF}">
-                <a14:hiddenLine xmlns:a14="http://schemas.microsoft.com/office/drawing/2010/main" xmlns="" w="9525">
+                <a14:hiddenLine xmlns="" xmlns:a14="http://schemas.microsoft.com/office/drawing/2010/main" w="9525">
                   <a:solidFill>
                     <a:srgbClr val="000000"/>
                   </a:solidFill>
@@ -1624,7 +1623,7 @@
             </a:ln>
             <a:extLst>
               <a:ext uri="{91240B29-F687-4f45-9708-019B960494DF}">
-                <a14:hiddenLine xmlns:a14="http://schemas.microsoft.com/office/drawing/2010/main" xmlns="" w="9525">
+                <a14:hiddenLine xmlns="" xmlns:a14="http://schemas.microsoft.com/office/drawing/2010/main" w="9525">
                   <a:solidFill>
                     <a:srgbClr val="000000"/>
                   </a:solidFill>
@@ -1714,7 +1713,7 @@
             </a:ln>
             <a:extLst>
               <a:ext uri="{91240B29-F687-4f45-9708-019B960494DF}">
-                <a14:hiddenLine xmlns:a14="http://schemas.microsoft.com/office/drawing/2010/main" xmlns="" w="9525">
+                <a14:hiddenLine xmlns="" xmlns:a14="http://schemas.microsoft.com/office/drawing/2010/main" w="9525">
                   <a:solidFill>
                     <a:srgbClr val="000000"/>
                   </a:solidFill>
@@ -1770,7 +1769,7 @@
             </a:ln>
             <a:extLst>
               <a:ext uri="{91240B29-F687-4f45-9708-019B960494DF}">
-                <a14:hiddenLine xmlns:a14="http://schemas.microsoft.com/office/drawing/2010/main" xmlns="" w="9525">
+                <a14:hiddenLine xmlns="" xmlns:a14="http://schemas.microsoft.com/office/drawing/2010/main" w="9525">
                   <a:solidFill>
                     <a:srgbClr val="000000"/>
                   </a:solidFill>
@@ -1860,7 +1859,7 @@
             </a:ln>
             <a:extLst>
               <a:ext uri="{91240B29-F687-4f45-9708-019B960494DF}">
-                <a14:hiddenLine xmlns:a14="http://schemas.microsoft.com/office/drawing/2010/main" xmlns="" w="9525">
+                <a14:hiddenLine xmlns="" xmlns:a14="http://schemas.microsoft.com/office/drawing/2010/main" w="9525">
                   <a:solidFill>
                     <a:srgbClr val="000000"/>
                   </a:solidFill>
@@ -1916,7 +1915,7 @@
             </a:ln>
             <a:extLst>
               <a:ext uri="{91240B29-F687-4f45-9708-019B960494DF}">
-                <a14:hiddenLine xmlns:a14="http://schemas.microsoft.com/office/drawing/2010/main" xmlns="" w="9525">
+                <a14:hiddenLine xmlns="" xmlns:a14="http://schemas.microsoft.com/office/drawing/2010/main" w="9525">
                   <a:solidFill>
                     <a:srgbClr val="000000"/>
                   </a:solidFill>
@@ -2006,7 +2005,7 @@
             </a:ln>
             <a:extLst>
               <a:ext uri="{91240B29-F687-4f45-9708-019B960494DF}">
-                <a14:hiddenLine xmlns:a14="http://schemas.microsoft.com/office/drawing/2010/main" xmlns="" w="9525">
+                <a14:hiddenLine xmlns="" xmlns:a14="http://schemas.microsoft.com/office/drawing/2010/main" w="9525">
                   <a:solidFill>
                     <a:srgbClr val="000000"/>
                   </a:solidFill>
@@ -2074,7 +2073,7 @@
             </a:ln>
             <a:extLst>
               <a:ext uri="{91240B29-F687-4f45-9708-019B960494DF}">
-                <a14:hiddenLine xmlns:a14="http://schemas.microsoft.com/office/drawing/2010/main" xmlns="" w="9525">
+                <a14:hiddenLine xmlns="" xmlns:a14="http://schemas.microsoft.com/office/drawing/2010/main" w="9525">
                   <a:solidFill>
                     <a:srgbClr val="000000"/>
                   </a:solidFill>
@@ -2164,7 +2163,7 @@
             </a:ln>
             <a:extLst>
               <a:ext uri="{91240B29-F687-4f45-9708-019B960494DF}">
-                <a14:hiddenLine xmlns:a14="http://schemas.microsoft.com/office/drawing/2010/main" xmlns="" w="9525">
+                <a14:hiddenLine xmlns="" xmlns:a14="http://schemas.microsoft.com/office/drawing/2010/main" w="9525">
                   <a:solidFill>
                     <a:srgbClr val="000000"/>
                   </a:solidFill>
@@ -2232,7 +2231,7 @@
             </a:ln>
             <a:extLst>
               <a:ext uri="{91240B29-F687-4f45-9708-019B960494DF}">
-                <a14:hiddenLine xmlns:a14="http://schemas.microsoft.com/office/drawing/2010/main" xmlns="" w="9525">
+                <a14:hiddenLine xmlns="" xmlns:a14="http://schemas.microsoft.com/office/drawing/2010/main" w="9525">
                   <a:solidFill>
                     <a:srgbClr val="000000"/>
                   </a:solidFill>
@@ -2322,7 +2321,7 @@
             </a:ln>
             <a:extLst>
               <a:ext uri="{91240B29-F687-4f45-9708-019B960494DF}">
-                <a14:hiddenLine xmlns:a14="http://schemas.microsoft.com/office/drawing/2010/main" xmlns="" w="9525">
+                <a14:hiddenLine xmlns="" xmlns:a14="http://schemas.microsoft.com/office/drawing/2010/main" w="9525">
                   <a:solidFill>
                     <a:srgbClr val="000000"/>
                   </a:solidFill>
@@ -2356,7 +2355,7 @@
             </a:ln>
             <a:extLst>
               <a:ext uri="{91240B29-F687-4f45-9708-019B960494DF}">
-                <a14:hiddenLine xmlns:a14="http://schemas.microsoft.com/office/drawing/2010/main" xmlns="" w="9525">
+                <a14:hiddenLine xmlns="" xmlns:a14="http://schemas.microsoft.com/office/drawing/2010/main" w="9525">
                   <a:solidFill>
                     <a:srgbClr val="000000"/>
                   </a:solidFill>
@@ -2446,7 +2445,7 @@
             </a:ln>
             <a:extLst>
               <a:ext uri="{91240B29-F687-4f45-9708-019B960494DF}">
-                <a14:hiddenLine xmlns:a14="http://schemas.microsoft.com/office/drawing/2010/main" xmlns="" w="9525">
+                <a14:hiddenLine xmlns="" xmlns:a14="http://schemas.microsoft.com/office/drawing/2010/main" w="9525">
                   <a:solidFill>
                     <a:srgbClr val="000000"/>
                   </a:solidFill>
@@ -2508,7 +2507,7 @@
             </a:ln>
             <a:extLst>
               <a:ext uri="{91240B29-F687-4f45-9708-019B960494DF}">
-                <a14:hiddenLine xmlns:a14="http://schemas.microsoft.com/office/drawing/2010/main" xmlns="" w="9525">
+                <a14:hiddenLine xmlns="" xmlns:a14="http://schemas.microsoft.com/office/drawing/2010/main" w="9525">
                   <a:solidFill>
                     <a:srgbClr val="000000"/>
                   </a:solidFill>
@@ -2570,7 +2569,7 @@
             </a:ln>
             <a:extLst>
               <a:ext uri="{91240B29-F687-4f45-9708-019B960494DF}">
-                <a14:hiddenLine xmlns:a14="http://schemas.microsoft.com/office/drawing/2010/main" xmlns="" w="9525">
+                <a14:hiddenLine xmlns="" xmlns:a14="http://schemas.microsoft.com/office/drawing/2010/main" w="9525">
                   <a:solidFill>
                     <a:srgbClr val="000000"/>
                   </a:solidFill>
@@ -2660,7 +2659,7 @@
             </a:ln>
             <a:extLst>
               <a:ext uri="{91240B29-F687-4f45-9708-019B960494DF}">
-                <a14:hiddenLine xmlns:a14="http://schemas.microsoft.com/office/drawing/2010/main" xmlns="" w="9525">
+                <a14:hiddenLine xmlns="" xmlns:a14="http://schemas.microsoft.com/office/drawing/2010/main" w="9525">
                   <a:solidFill>
                     <a:srgbClr val="000000"/>
                   </a:solidFill>
@@ -2728,7 +2727,7 @@
             </a:ln>
             <a:extLst>
               <a:ext uri="{91240B29-F687-4f45-9708-019B960494DF}">
-                <a14:hiddenLine xmlns:a14="http://schemas.microsoft.com/office/drawing/2010/main" xmlns="" w="9525">
+                <a14:hiddenLine xmlns="" xmlns:a14="http://schemas.microsoft.com/office/drawing/2010/main" w="9525">
                   <a:solidFill>
                     <a:srgbClr val="000000"/>
                   </a:solidFill>
@@ -2790,7 +2789,7 @@
             </a:ln>
             <a:extLst>
               <a:ext uri="{91240B29-F687-4f45-9708-019B960494DF}">
-                <a14:hiddenLine xmlns:a14="http://schemas.microsoft.com/office/drawing/2010/main" xmlns="" w="9525">
+                <a14:hiddenLine xmlns="" xmlns:a14="http://schemas.microsoft.com/office/drawing/2010/main" w="9525">
                   <a:solidFill>
                     <a:srgbClr val="000000"/>
                   </a:solidFill>
@@ -2880,7 +2879,7 @@
             </a:ln>
             <a:extLst>
               <a:ext uri="{91240B29-F687-4f45-9708-019B960494DF}">
-                <a14:hiddenLine xmlns:a14="http://schemas.microsoft.com/office/drawing/2010/main" xmlns="" w="9525">
+                <a14:hiddenLine xmlns="" xmlns:a14="http://schemas.microsoft.com/office/drawing/2010/main" w="9525">
                   <a:solidFill>
                     <a:srgbClr val="000000"/>
                   </a:solidFill>
@@ -2942,7 +2941,7 @@
             </a:ln>
             <a:extLst>
               <a:ext uri="{91240B29-F687-4f45-9708-019B960494DF}">
-                <a14:hiddenLine xmlns:a14="http://schemas.microsoft.com/office/drawing/2010/main" xmlns="" w="9525">
+                <a14:hiddenLine xmlns="" xmlns:a14="http://schemas.microsoft.com/office/drawing/2010/main" w="9525">
                   <a:solidFill>
                     <a:srgbClr val="000000"/>
                   </a:solidFill>
@@ -3032,7 +3031,7 @@
             </a:ln>
             <a:extLst>
               <a:ext uri="{91240B29-F687-4f45-9708-019B960494DF}">
-                <a14:hiddenLine xmlns:a14="http://schemas.microsoft.com/office/drawing/2010/main" xmlns="" w="9525">
+                <a14:hiddenLine xmlns="" xmlns:a14="http://schemas.microsoft.com/office/drawing/2010/main" w="9525">
                   <a:solidFill>
                     <a:srgbClr val="000000"/>
                   </a:solidFill>
@@ -3094,7 +3093,7 @@
             </a:ln>
             <a:extLst>
               <a:ext uri="{91240B29-F687-4f45-9708-019B960494DF}">
-                <a14:hiddenLine xmlns:a14="http://schemas.microsoft.com/office/drawing/2010/main" xmlns="" w="9525">
+                <a14:hiddenLine xmlns="" xmlns:a14="http://schemas.microsoft.com/office/drawing/2010/main" w="9525">
                   <a:solidFill>
                     <a:srgbClr val="000000"/>
                   </a:solidFill>
@@ -3184,7 +3183,7 @@
             </a:ln>
             <a:extLst>
               <a:ext uri="{91240B29-F687-4f45-9708-019B960494DF}">
-                <a14:hiddenLine xmlns:a14="http://schemas.microsoft.com/office/drawing/2010/main" xmlns="" w="9525">
+                <a14:hiddenLine xmlns="" xmlns:a14="http://schemas.microsoft.com/office/drawing/2010/main" w="9525">
                   <a:solidFill>
                     <a:srgbClr val="000000"/>
                   </a:solidFill>
@@ -3218,7 +3217,7 @@
             </a:ln>
             <a:extLst>
               <a:ext uri="{91240B29-F687-4f45-9708-019B960494DF}">
-                <a14:hiddenLine xmlns:a14="http://schemas.microsoft.com/office/drawing/2010/main" xmlns="" w="9525">
+                <a14:hiddenLine xmlns="" xmlns:a14="http://schemas.microsoft.com/office/drawing/2010/main" w="9525">
                   <a:solidFill>
                     <a:srgbClr val="000000"/>
                   </a:solidFill>
@@ -3283,7 +3282,7 @@
             </a:ln>
             <a:extLst>
               <a:ext uri="{91240B29-F687-4f45-9708-019B960494DF}">
-                <a14:hiddenLine xmlns:a14="http://schemas.microsoft.com/office/drawing/2010/main" xmlns="" w="9525">
+                <a14:hiddenLine xmlns="" xmlns:a14="http://schemas.microsoft.com/office/drawing/2010/main" w="9525">
                   <a:solidFill>
                     <a:srgbClr val="000000"/>
                   </a:solidFill>
@@ -3373,7 +3372,7 @@
             </a:ln>
             <a:extLst>
               <a:ext uri="{91240B29-F687-4f45-9708-019B960494DF}">
-                <a14:hiddenLine xmlns:a14="http://schemas.microsoft.com/office/drawing/2010/main" xmlns="" w="9525">
+                <a14:hiddenLine xmlns="" xmlns:a14="http://schemas.microsoft.com/office/drawing/2010/main" w="9525">
                   <a:solidFill>
                     <a:srgbClr val="000000"/>
                   </a:solidFill>
@@ -3435,7 +3434,7 @@
             </a:ln>
             <a:extLst>
               <a:ext uri="{91240B29-F687-4f45-9708-019B960494DF}">
-                <a14:hiddenLine xmlns:a14="http://schemas.microsoft.com/office/drawing/2010/main" xmlns="" w="9525">
+                <a14:hiddenLine xmlns="" xmlns:a14="http://schemas.microsoft.com/office/drawing/2010/main" w="9525">
                   <a:solidFill>
                     <a:srgbClr val="000000"/>
                   </a:solidFill>
@@ -3525,7 +3524,7 @@
             </a:ln>
             <a:extLst>
               <a:ext uri="{91240B29-F687-4f45-9708-019B960494DF}">
-                <a14:hiddenLine xmlns:a14="http://schemas.microsoft.com/office/drawing/2010/main" xmlns="" w="9525">
+                <a14:hiddenLine xmlns="" xmlns:a14="http://schemas.microsoft.com/office/drawing/2010/main" w="9525">
                   <a:solidFill>
                     <a:srgbClr val="000000"/>
                   </a:solidFill>
@@ -3615,7 +3614,7 @@
             </a:ln>
             <a:extLst>
               <a:ext uri="{91240B29-F687-4f45-9708-019B960494DF}">
-                <a14:hiddenLine xmlns:a14="http://schemas.microsoft.com/office/drawing/2010/main" xmlns="" w="9525">
+                <a14:hiddenLine xmlns="" xmlns:a14="http://schemas.microsoft.com/office/drawing/2010/main" w="9525">
                   <a:solidFill>
                     <a:srgbClr val="000000"/>
                   </a:solidFill>
@@ -3680,7 +3679,7 @@
             </a:ln>
             <a:extLst>
               <a:ext uri="{91240B29-F687-4f45-9708-019B960494DF}">
-                <a14:hiddenLine xmlns:a14="http://schemas.microsoft.com/office/drawing/2010/main" xmlns="" w="9525">
+                <a14:hiddenLine xmlns="" xmlns:a14="http://schemas.microsoft.com/office/drawing/2010/main" w="9525">
                   <a:solidFill>
                     <a:srgbClr val="000000"/>
                   </a:solidFill>
@@ -3742,7 +3741,7 @@
             </a:ln>
             <a:extLst>
               <a:ext uri="{91240B29-F687-4f45-9708-019B960494DF}">
-                <a14:hiddenLine xmlns:a14="http://schemas.microsoft.com/office/drawing/2010/main" xmlns="" w="9525">
+                <a14:hiddenLine xmlns="" xmlns:a14="http://schemas.microsoft.com/office/drawing/2010/main" w="9525">
                   <a:solidFill>
                     <a:srgbClr val="000000"/>
                   </a:solidFill>
@@ -3832,7 +3831,7 @@
             </a:ln>
             <a:extLst>
               <a:ext uri="{91240B29-F687-4f45-9708-019B960494DF}">
-                <a14:hiddenLine xmlns:a14="http://schemas.microsoft.com/office/drawing/2010/main" xmlns="" w="9525">
+                <a14:hiddenLine xmlns="" xmlns:a14="http://schemas.microsoft.com/office/drawing/2010/main" w="9525">
                   <a:solidFill>
                     <a:srgbClr val="000000"/>
                   </a:solidFill>
@@ -3922,7 +3921,7 @@
             </a:ln>
             <a:extLst>
               <a:ext uri="{91240B29-F687-4f45-9708-019B960494DF}">
-                <a14:hiddenLine xmlns:a14="http://schemas.microsoft.com/office/drawing/2010/main" xmlns="" w="9525">
+                <a14:hiddenLine xmlns="" xmlns:a14="http://schemas.microsoft.com/office/drawing/2010/main" w="9525">
                   <a:solidFill>
                     <a:srgbClr val="000000"/>
                   </a:solidFill>
@@ -3984,7 +3983,7 @@
             </a:ln>
             <a:extLst>
               <a:ext uri="{91240B29-F687-4f45-9708-019B960494DF}">
-                <a14:hiddenLine xmlns:a14="http://schemas.microsoft.com/office/drawing/2010/main" xmlns="" w="9525">
+                <a14:hiddenLine xmlns="" xmlns:a14="http://schemas.microsoft.com/office/drawing/2010/main" w="9525">
                   <a:solidFill>
                     <a:srgbClr val="000000"/>
                   </a:solidFill>
@@ -4104,7 +4103,7 @@
             </a:ln>
             <a:extLst>
               <a:ext uri="{91240B29-F687-4f45-9708-019B960494DF}">
-                <a14:hiddenLine xmlns:a14="http://schemas.microsoft.com/office/drawing/2010/main" xmlns="" w="9525">
+                <a14:hiddenLine xmlns="" xmlns:a14="http://schemas.microsoft.com/office/drawing/2010/main" w="9525">
                   <a:solidFill>
                     <a:srgbClr val="000000"/>
                   </a:solidFill>
@@ -4172,7 +4171,7 @@
             </a:ln>
             <a:extLst>
               <a:ext uri="{91240B29-F687-4f45-9708-019B960494DF}">
-                <a14:hiddenLine xmlns:a14="http://schemas.microsoft.com/office/drawing/2010/main" xmlns="" w="9525">
+                <a14:hiddenLine xmlns="" xmlns:a14="http://schemas.microsoft.com/office/drawing/2010/main" w="9525">
                   <a:solidFill>
                     <a:srgbClr val="000000"/>
                   </a:solidFill>
@@ -4262,7 +4261,7 @@
             </a:ln>
             <a:extLst>
               <a:ext uri="{91240B29-F687-4f45-9708-019B960494DF}">
-                <a14:hiddenLine xmlns:a14="http://schemas.microsoft.com/office/drawing/2010/main" xmlns="" w="9525">
+                <a14:hiddenLine xmlns="" xmlns:a14="http://schemas.microsoft.com/office/drawing/2010/main" w="9525">
                   <a:solidFill>
                     <a:srgbClr val="000000"/>
                   </a:solidFill>
@@ -9134,7 +9133,7 @@
           <a:noFill/>
           <a:extLst>
             <a:ext uri="{909E8E84-426E-40dd-AFC4-6F175D3DCCD1}">
-              <a14:hiddenFill xmlns:a14="http://schemas.microsoft.com/office/drawing/2010/main" xmlns="">
+              <a14:hiddenFill xmlns="" xmlns:a14="http://schemas.microsoft.com/office/drawing/2010/main">
                 <a:solidFill>
                   <a:srgbClr val="FFFFFF"/>
                 </a:solidFill>
@@ -9208,7 +9207,7 @@
               </a:ln>
               <a:extLst>
                 <a:ext uri="{91240B29-F687-4f45-9708-019B960494DF}">
-                  <a14:hiddenLine xmlns:a14="http://schemas.microsoft.com/office/drawing/2010/main" xmlns="" w="9525">
+                  <a14:hiddenLine xmlns="" xmlns:a14="http://schemas.microsoft.com/office/drawing/2010/main" w="9525">
                     <a:solidFill>
                       <a:srgbClr val="000000"/>
                     </a:solidFill>
@@ -9298,7 +9297,7 @@
               </a:ln>
               <a:extLst>
                 <a:ext uri="{91240B29-F687-4f45-9708-019B960494DF}">
-                  <a14:hiddenLine xmlns:a14="http://schemas.microsoft.com/office/drawing/2010/main" xmlns="" w="9525">
+                  <a14:hiddenLine xmlns="" xmlns:a14="http://schemas.microsoft.com/office/drawing/2010/main" w="9525">
                     <a:solidFill>
                       <a:srgbClr val="000000"/>
                     </a:solidFill>
@@ -9388,7 +9387,7 @@
               </a:ln>
               <a:extLst>
                 <a:ext uri="{91240B29-F687-4f45-9708-019B960494DF}">
-                  <a14:hiddenLine xmlns:a14="http://schemas.microsoft.com/office/drawing/2010/main" xmlns="" w="9525">
+                  <a14:hiddenLine xmlns="" xmlns:a14="http://schemas.microsoft.com/office/drawing/2010/main" w="9525">
                     <a:solidFill>
                       <a:srgbClr val="000000"/>
                     </a:solidFill>
@@ -9450,7 +9449,7 @@
               </a:ln>
               <a:extLst>
                 <a:ext uri="{91240B29-F687-4f45-9708-019B960494DF}">
-                  <a14:hiddenLine xmlns:a14="http://schemas.microsoft.com/office/drawing/2010/main" xmlns="" w="9525">
+                  <a14:hiddenLine xmlns="" xmlns:a14="http://schemas.microsoft.com/office/drawing/2010/main" w="9525">
                     <a:solidFill>
                       <a:srgbClr val="000000"/>
                     </a:solidFill>
@@ -9540,7 +9539,7 @@
               </a:ln>
               <a:extLst>
                 <a:ext uri="{91240B29-F687-4f45-9708-019B960494DF}">
-                  <a14:hiddenLine xmlns:a14="http://schemas.microsoft.com/office/drawing/2010/main" xmlns="" w="9525">
+                  <a14:hiddenLine xmlns="" xmlns:a14="http://schemas.microsoft.com/office/drawing/2010/main" w="9525">
                     <a:solidFill>
                       <a:srgbClr val="000000"/>
                     </a:solidFill>
@@ -9602,7 +9601,7 @@
               </a:ln>
               <a:extLst>
                 <a:ext uri="{91240B29-F687-4f45-9708-019B960494DF}">
-                  <a14:hiddenLine xmlns:a14="http://schemas.microsoft.com/office/drawing/2010/main" xmlns="" w="9525">
+                  <a14:hiddenLine xmlns="" xmlns:a14="http://schemas.microsoft.com/office/drawing/2010/main" w="9525">
                     <a:solidFill>
                       <a:srgbClr val="000000"/>
                     </a:solidFill>
@@ -9664,7 +9663,7 @@
               </a:ln>
               <a:extLst>
                 <a:ext uri="{91240B29-F687-4f45-9708-019B960494DF}">
-                  <a14:hiddenLine xmlns:a14="http://schemas.microsoft.com/office/drawing/2010/main" xmlns="" w="9525">
+                  <a14:hiddenLine xmlns="" xmlns:a14="http://schemas.microsoft.com/office/drawing/2010/main" w="9525">
                     <a:solidFill>
                       <a:srgbClr val="000000"/>
                     </a:solidFill>
@@ -9754,7 +9753,7 @@
               </a:ln>
               <a:extLst>
                 <a:ext uri="{91240B29-F687-4f45-9708-019B960494DF}">
-                  <a14:hiddenLine xmlns:a14="http://schemas.microsoft.com/office/drawing/2010/main" xmlns="" w="9525">
+                  <a14:hiddenLine xmlns="" xmlns:a14="http://schemas.microsoft.com/office/drawing/2010/main" w="9525">
                     <a:solidFill>
                       <a:srgbClr val="000000"/>
                     </a:solidFill>
@@ -9844,7 +9843,7 @@
               </a:ln>
               <a:extLst>
                 <a:ext uri="{91240B29-F687-4f45-9708-019B960494DF}">
-                  <a14:hiddenLine xmlns:a14="http://schemas.microsoft.com/office/drawing/2010/main" xmlns="" w="9525">
+                  <a14:hiddenLine xmlns="" xmlns:a14="http://schemas.microsoft.com/office/drawing/2010/main" w="9525">
                     <a:solidFill>
                       <a:srgbClr val="000000"/>
                     </a:solidFill>
@@ -9906,7 +9905,7 @@
               </a:ln>
               <a:extLst>
                 <a:ext uri="{91240B29-F687-4f45-9708-019B960494DF}">
-                  <a14:hiddenLine xmlns:a14="http://schemas.microsoft.com/office/drawing/2010/main" xmlns="" w="9525">
+                  <a14:hiddenLine xmlns="" xmlns:a14="http://schemas.microsoft.com/office/drawing/2010/main" w="9525">
                     <a:solidFill>
                       <a:srgbClr val="000000"/>
                     </a:solidFill>
@@ -10016,7 +10015,7 @@
               </a:ln>
               <a:extLst>
                 <a:ext uri="{91240B29-F687-4f45-9708-019B960494DF}">
-                  <a14:hiddenLine xmlns:a14="http://schemas.microsoft.com/office/drawing/2010/main" xmlns="" w="9525">
+                  <a14:hiddenLine xmlns="" xmlns:a14="http://schemas.microsoft.com/office/drawing/2010/main" w="9525">
                     <a:solidFill>
                       <a:srgbClr val="000000"/>
                     </a:solidFill>
@@ -10100,7 +10099,7 @@
               </a:ln>
               <a:extLst>
                 <a:ext uri="{91240B29-F687-4f45-9708-019B960494DF}">
-                  <a14:hiddenLine xmlns:a14="http://schemas.microsoft.com/office/drawing/2010/main" xmlns="" w="9525">
+                  <a14:hiddenLine xmlns="" xmlns:a14="http://schemas.microsoft.com/office/drawing/2010/main" w="9525">
                     <a:solidFill>
                       <a:srgbClr val="000000"/>
                     </a:solidFill>
@@ -10162,7 +10161,7 @@
               </a:ln>
               <a:extLst>
                 <a:ext uri="{91240B29-F687-4f45-9708-019B960494DF}">
-                  <a14:hiddenLine xmlns:a14="http://schemas.microsoft.com/office/drawing/2010/main" xmlns="" w="9525">
+                  <a14:hiddenLine xmlns="" xmlns:a14="http://schemas.microsoft.com/office/drawing/2010/main" w="9525">
                     <a:solidFill>
                       <a:srgbClr val="000000"/>
                     </a:solidFill>
@@ -10224,7 +10223,7 @@
               </a:ln>
               <a:extLst>
                 <a:ext uri="{91240B29-F687-4f45-9708-019B960494DF}">
-                  <a14:hiddenLine xmlns:a14="http://schemas.microsoft.com/office/drawing/2010/main" xmlns="" w="9525">
+                  <a14:hiddenLine xmlns="" xmlns:a14="http://schemas.microsoft.com/office/drawing/2010/main" w="9525">
                     <a:solidFill>
                       <a:srgbClr val="000000"/>
                     </a:solidFill>
@@ -10314,7 +10313,7 @@
               </a:ln>
               <a:extLst>
                 <a:ext uri="{91240B29-F687-4f45-9708-019B960494DF}">
-                  <a14:hiddenLine xmlns:a14="http://schemas.microsoft.com/office/drawing/2010/main" xmlns="" w="9525">
+                  <a14:hiddenLine xmlns="" xmlns:a14="http://schemas.microsoft.com/office/drawing/2010/main" w="9525">
                     <a:solidFill>
                       <a:srgbClr val="000000"/>
                     </a:solidFill>
@@ -10348,7 +10347,7 @@
               </a:ln>
               <a:extLst>
                 <a:ext uri="{91240B29-F687-4f45-9708-019B960494DF}">
-                  <a14:hiddenLine xmlns:a14="http://schemas.microsoft.com/office/drawing/2010/main" xmlns="" w="9525">
+                  <a14:hiddenLine xmlns="" xmlns:a14="http://schemas.microsoft.com/office/drawing/2010/main" w="9525">
                     <a:solidFill>
                       <a:srgbClr val="000000"/>
                     </a:solidFill>
@@ -10413,7 +10412,7 @@
               </a:ln>
               <a:extLst>
                 <a:ext uri="{91240B29-F687-4f45-9708-019B960494DF}">
-                  <a14:hiddenLine xmlns:a14="http://schemas.microsoft.com/office/drawing/2010/main" xmlns="" w="9525">
+                  <a14:hiddenLine xmlns="" xmlns:a14="http://schemas.microsoft.com/office/drawing/2010/main" w="9525">
                     <a:solidFill>
                       <a:srgbClr val="000000"/>
                     </a:solidFill>
@@ -10503,7 +10502,7 @@
               </a:ln>
               <a:extLst>
                 <a:ext uri="{91240B29-F687-4f45-9708-019B960494DF}">
-                  <a14:hiddenLine xmlns:a14="http://schemas.microsoft.com/office/drawing/2010/main" xmlns="" w="9525">
+                  <a14:hiddenLine xmlns="" xmlns:a14="http://schemas.microsoft.com/office/drawing/2010/main" w="9525">
                     <a:solidFill>
                       <a:srgbClr val="000000"/>
                     </a:solidFill>
@@ -10565,7 +10564,7 @@
               </a:ln>
               <a:extLst>
                 <a:ext uri="{91240B29-F687-4f45-9708-019B960494DF}">
-                  <a14:hiddenLine xmlns:a14="http://schemas.microsoft.com/office/drawing/2010/main" xmlns="" w="9525">
+                  <a14:hiddenLine xmlns="" xmlns:a14="http://schemas.microsoft.com/office/drawing/2010/main" w="9525">
                     <a:solidFill>
                       <a:srgbClr val="000000"/>
                     </a:solidFill>
@@ -10655,7 +10654,7 @@
               </a:ln>
               <a:extLst>
                 <a:ext uri="{91240B29-F687-4f45-9708-019B960494DF}">
-                  <a14:hiddenLine xmlns:a14="http://schemas.microsoft.com/office/drawing/2010/main" xmlns="" w="9525">
+                  <a14:hiddenLine xmlns="" xmlns:a14="http://schemas.microsoft.com/office/drawing/2010/main" w="9525">
                     <a:solidFill>
                       <a:srgbClr val="000000"/>
                     </a:solidFill>
@@ -10720,7 +10719,7 @@
               </a:ln>
               <a:extLst>
                 <a:ext uri="{91240B29-F687-4f45-9708-019B960494DF}">
-                  <a14:hiddenLine xmlns:a14="http://schemas.microsoft.com/office/drawing/2010/main" xmlns="" w="9525">
+                  <a14:hiddenLine xmlns="" xmlns:a14="http://schemas.microsoft.com/office/drawing/2010/main" w="9525">
                     <a:solidFill>
                       <a:srgbClr val="000000"/>
                     </a:solidFill>
@@ -10782,7 +10781,7 @@
               </a:ln>
               <a:extLst>
                 <a:ext uri="{91240B29-F687-4f45-9708-019B960494DF}">
-                  <a14:hiddenLine xmlns:a14="http://schemas.microsoft.com/office/drawing/2010/main" xmlns="" w="9525">
+                  <a14:hiddenLine xmlns="" xmlns:a14="http://schemas.microsoft.com/office/drawing/2010/main" w="9525">
                     <a:solidFill>
                       <a:srgbClr val="000000"/>
                     </a:solidFill>
@@ -10872,7 +10871,7 @@
               </a:ln>
               <a:extLst>
                 <a:ext uri="{91240B29-F687-4f45-9708-019B960494DF}">
-                  <a14:hiddenLine xmlns:a14="http://schemas.microsoft.com/office/drawing/2010/main" xmlns="" w="9525">
+                  <a14:hiddenLine xmlns="" xmlns:a14="http://schemas.microsoft.com/office/drawing/2010/main" w="9525">
                     <a:solidFill>
                       <a:srgbClr val="000000"/>
                     </a:solidFill>
@@ -10962,7 +10961,7 @@
               </a:ln>
               <a:extLst>
                 <a:ext uri="{91240B29-F687-4f45-9708-019B960494DF}">
-                  <a14:hiddenLine xmlns:a14="http://schemas.microsoft.com/office/drawing/2010/main" xmlns="" w="9525">
+                  <a14:hiddenLine xmlns="" xmlns:a14="http://schemas.microsoft.com/office/drawing/2010/main" w="9525">
                     <a:solidFill>
                       <a:srgbClr val="000000"/>
                     </a:solidFill>
@@ -11027,7 +11026,7 @@
               </a:ln>
               <a:extLst>
                 <a:ext uri="{91240B29-F687-4f45-9708-019B960494DF}">
-                  <a14:hiddenLine xmlns:a14="http://schemas.microsoft.com/office/drawing/2010/main" xmlns="" w="9525">
+                  <a14:hiddenLine xmlns="" xmlns:a14="http://schemas.microsoft.com/office/drawing/2010/main" w="9525">
                     <a:solidFill>
                       <a:srgbClr val="000000"/>
                     </a:solidFill>
@@ -11147,7 +11146,7 @@
               </a:ln>
               <a:extLst>
                 <a:ext uri="{91240B29-F687-4f45-9708-019B960494DF}">
-                  <a14:hiddenLine xmlns:a14="http://schemas.microsoft.com/office/drawing/2010/main" xmlns="" w="9525">
+                  <a14:hiddenLine xmlns="" xmlns:a14="http://schemas.microsoft.com/office/drawing/2010/main" w="9525">
                     <a:solidFill>
                       <a:srgbClr val="000000"/>
                     </a:solidFill>
@@ -11245,7 +11244,7 @@
               </a:ln>
               <a:extLst>
                 <a:ext uri="{91240B29-F687-4f45-9708-019B960494DF}">
-                  <a14:hiddenLine xmlns:a14="http://schemas.microsoft.com/office/drawing/2010/main" xmlns="" w="9525">
+                  <a14:hiddenLine xmlns="" xmlns:a14="http://schemas.microsoft.com/office/drawing/2010/main" w="9525">
                     <a:solidFill>
                       <a:srgbClr val="000000"/>
                     </a:solidFill>
@@ -11360,7 +11359,7 @@
               </a:ln>
               <a:extLst>
                 <a:ext uri="{91240B29-F687-4f45-9708-019B960494DF}">
-                  <a14:hiddenLine xmlns:a14="http://schemas.microsoft.com/office/drawing/2010/main" xmlns="" w="9525">
+                  <a14:hiddenLine xmlns="" xmlns:a14="http://schemas.microsoft.com/office/drawing/2010/main" w="9525">
                     <a:solidFill>
                       <a:srgbClr val="000000"/>
                     </a:solidFill>
@@ -11450,7 +11449,7 @@
               </a:ln>
               <a:extLst>
                 <a:ext uri="{91240B29-F687-4f45-9708-019B960494DF}">
-                  <a14:hiddenLine xmlns:a14="http://schemas.microsoft.com/office/drawing/2010/main" xmlns="" w="9525">
+                  <a14:hiddenLine xmlns="" xmlns:a14="http://schemas.microsoft.com/office/drawing/2010/main" w="9525">
                     <a:solidFill>
                       <a:srgbClr val="000000"/>
                     </a:solidFill>
@@ -11515,7 +11514,7 @@
               </a:ln>
               <a:extLst>
                 <a:ext uri="{91240B29-F687-4f45-9708-019B960494DF}">
-                  <a14:hiddenLine xmlns:a14="http://schemas.microsoft.com/office/drawing/2010/main" xmlns="" w="9525">
+                  <a14:hiddenLine xmlns="" xmlns:a14="http://schemas.microsoft.com/office/drawing/2010/main" w="9525">
                     <a:solidFill>
                       <a:srgbClr val="000000"/>
                     </a:solidFill>
@@ -11605,7 +11604,7 @@
               </a:ln>
               <a:extLst>
                 <a:ext uri="{91240B29-F687-4f45-9708-019B960494DF}">
-                  <a14:hiddenLine xmlns:a14="http://schemas.microsoft.com/office/drawing/2010/main" xmlns="" w="9525">
+                  <a14:hiddenLine xmlns="" xmlns:a14="http://schemas.microsoft.com/office/drawing/2010/main" w="9525">
                     <a:solidFill>
                       <a:srgbClr val="000000"/>
                     </a:solidFill>
@@ -11673,7 +11672,7 @@
               </a:ln>
               <a:extLst>
                 <a:ext uri="{91240B29-F687-4f45-9708-019B960494DF}">
-                  <a14:hiddenLine xmlns:a14="http://schemas.microsoft.com/office/drawing/2010/main" xmlns="" w="9525">
+                  <a14:hiddenLine xmlns="" xmlns:a14="http://schemas.microsoft.com/office/drawing/2010/main" w="9525">
                     <a:solidFill>
                       <a:srgbClr val="000000"/>
                     </a:solidFill>
@@ -11763,7 +11762,7 @@
               </a:ln>
               <a:extLst>
                 <a:ext uri="{91240B29-F687-4f45-9708-019B960494DF}">
-                  <a14:hiddenLine xmlns:a14="http://schemas.microsoft.com/office/drawing/2010/main" xmlns="" w="9525">
+                  <a14:hiddenLine xmlns="" xmlns:a14="http://schemas.microsoft.com/office/drawing/2010/main" w="9525">
                     <a:solidFill>
                       <a:srgbClr val="000000"/>
                     </a:solidFill>
@@ -11831,7 +11830,7 @@
               </a:ln>
               <a:extLst>
                 <a:ext uri="{91240B29-F687-4f45-9708-019B960494DF}">
-                  <a14:hiddenLine xmlns:a14="http://schemas.microsoft.com/office/drawing/2010/main" xmlns="" w="9525">
+                  <a14:hiddenLine xmlns="" xmlns:a14="http://schemas.microsoft.com/office/drawing/2010/main" w="9525">
                     <a:solidFill>
                       <a:srgbClr val="000000"/>
                     </a:solidFill>
@@ -11921,7 +11920,7 @@
               </a:ln>
               <a:extLst>
                 <a:ext uri="{91240B29-F687-4f45-9708-019B960494DF}">
-                  <a14:hiddenLine xmlns:a14="http://schemas.microsoft.com/office/drawing/2010/main" xmlns="" w="9525">
+                  <a14:hiddenLine xmlns="" xmlns:a14="http://schemas.microsoft.com/office/drawing/2010/main" w="9525">
                     <a:solidFill>
                       <a:srgbClr val="000000"/>
                     </a:solidFill>
@@ -11955,7 +11954,7 @@
               </a:ln>
               <a:extLst>
                 <a:ext uri="{91240B29-F687-4f45-9708-019B960494DF}">
-                  <a14:hiddenLine xmlns:a14="http://schemas.microsoft.com/office/drawing/2010/main" xmlns="" w="9525">
+                  <a14:hiddenLine xmlns="" xmlns:a14="http://schemas.microsoft.com/office/drawing/2010/main" w="9525">
                     <a:solidFill>
                       <a:srgbClr val="000000"/>
                     </a:solidFill>
@@ -12671,8 +12670,8 @@
         </p:nvSpPr>
         <p:spPr>
           <a:xfrm>
-            <a:off x="899886" y="725214"/>
-            <a:ext cx="11030857" cy="5777186"/>
+            <a:off x="723014" y="725214"/>
+            <a:ext cx="11344940" cy="5065987"/>
           </a:xfrm>
         </p:spPr>
         <p:txBody>
@@ -12685,46 +12684,169 @@
               <a:buNone/>
             </a:pPr>
             <a:r>
-              <a:rPr lang="en-US" sz="3200" dirty="0">
+              <a:rPr lang="en-US" dirty="0">
                 <a:solidFill>
                   <a:schemeClr val="bg1"/>
                 </a:solidFill>
               </a:rPr>
-              <a:t>Windows container running </a:t>
-            </a:r>
-            <a:r>
-              <a:rPr lang="en-US" sz="3200" dirty="0" err="1">
-                <a:solidFill>
-                  <a:schemeClr val="bg1"/>
-                </a:solidFill>
+              <a:t>Asp.net Core with Windows Container</a:t>
+            </a:r>
+          </a:p>
+          <a:p>
+            <a:r>
+              <a:rPr lang="en-US" sz="1900" dirty="0" err="1">
+                <a:solidFill>
+                  <a:schemeClr val="accent1"/>
+                </a:solidFill>
+                <a:highlight>
+                  <a:srgbClr val="000000"/>
+                </a:highlight>
+                <a:latin typeface="Consolas" panose="020B0609020204030204" pitchFamily="49" charset="0"/>
               </a:rPr>
-              <a:t>Powershell</a:t>
-            </a:r>
-            <a:r>
-              <a:rPr lang="en-US" sz="3200" dirty="0">
-                <a:solidFill>
-                  <a:schemeClr val="bg1"/>
-                </a:solidFill>
+              <a:t>dotnet</a:t>
+            </a:r>
+            <a:r>
+              <a:rPr lang="en-US" sz="1900" dirty="0">
+                <a:solidFill>
+                  <a:schemeClr val="accent1"/>
+                </a:solidFill>
+                <a:highlight>
+                  <a:srgbClr val="000000"/>
+                </a:highlight>
+                <a:latin typeface="Consolas" panose="020B0609020204030204" pitchFamily="49" charset="0"/>
               </a:rPr>
-              <a:t> script</a:t>
-            </a:r>
-          </a:p>
-          <a:p>
-            <a:r>
-              <a:rPr lang="en-US" sz="2600" dirty="0"/>
-              <a:t>Linux and Windows images and containers are completely separated</a:t>
-            </a:r>
-          </a:p>
-          <a:p>
-            <a:pPr lvl="1"/>
-            <a:r>
-              <a:rPr lang="en-US" sz="2200" dirty="0"/>
-              <a:t>Right-click Docker icon in system tray &gt; Switch to Windows Containers</a:t>
-            </a:r>
-          </a:p>
-          <a:p>
-            <a:r>
-              <a:rPr lang="en-US" sz="1900" dirty="0" err="1">
+              <a:t> new</a:t>
+            </a:r>
+          </a:p>
+          <a:p>
+            <a:r>
+              <a:rPr lang="en-US" dirty="0"/>
+              <a:t>Update </a:t>
+            </a:r>
+            <a:r>
+              <a:rPr lang="en-US" dirty="0" err="1"/>
+              <a:t>project.json</a:t>
+            </a:r>
+            <a:r>
+              <a:rPr lang="en-US" dirty="0"/>
+              <a:t> and </a:t>
+            </a:r>
+            <a:r>
+              <a:rPr lang="en-US" dirty="0" err="1"/>
+              <a:t>Program.cs</a:t>
+            </a:r>
+            <a:endParaRPr lang="en-US" dirty="0"/>
+          </a:p>
+          <a:p>
+            <a:r>
+              <a:rPr lang="en-US" sz="1800" dirty="0" err="1">
+                <a:solidFill>
+                  <a:schemeClr val="accent1"/>
+                </a:solidFill>
+                <a:highlight>
+                  <a:srgbClr val="000000"/>
+                </a:highlight>
+                <a:latin typeface="Consolas" panose="020B0609020204030204" pitchFamily="49" charset="0"/>
+              </a:rPr>
+              <a:t>dotnet</a:t>
+            </a:r>
+            <a:r>
+              <a:rPr lang="en-US" sz="1800" dirty="0">
+                <a:solidFill>
+                  <a:schemeClr val="accent1"/>
+                </a:solidFill>
+                <a:highlight>
+                  <a:srgbClr val="000000"/>
+                </a:highlight>
+                <a:latin typeface="Consolas" panose="020B0609020204030204" pitchFamily="49" charset="0"/>
+              </a:rPr>
+              <a:t> restore</a:t>
+            </a:r>
+            <a:br>
+              <a:rPr lang="en-US" sz="1800" dirty="0">
+                <a:solidFill>
+                  <a:schemeClr val="accent1"/>
+                </a:solidFill>
+                <a:highlight>
+                  <a:srgbClr val="000000"/>
+                </a:highlight>
+                <a:latin typeface="Consolas" panose="020B0609020204030204" pitchFamily="49" charset="0"/>
+              </a:rPr>
+            </a:br>
+            <a:r>
+              <a:rPr lang="en-US" sz="1800" dirty="0" err="1">
+                <a:solidFill>
+                  <a:schemeClr val="accent1"/>
+                </a:solidFill>
+                <a:highlight>
+                  <a:srgbClr val="000000"/>
+                </a:highlight>
+                <a:latin typeface="Consolas" panose="020B0609020204030204" pitchFamily="49" charset="0"/>
+              </a:rPr>
+              <a:t>dotnet</a:t>
+            </a:r>
+            <a:r>
+              <a:rPr lang="en-US" sz="1800" dirty="0">
+                <a:solidFill>
+                  <a:schemeClr val="accent1"/>
+                </a:solidFill>
+                <a:highlight>
+                  <a:srgbClr val="000000"/>
+                </a:highlight>
+                <a:latin typeface="Consolas" panose="020B0609020204030204" pitchFamily="49" charset="0"/>
+              </a:rPr>
+              <a:t> run</a:t>
+            </a:r>
+            <a:br>
+              <a:rPr lang="en-US" sz="1800" dirty="0">
+                <a:solidFill>
+                  <a:schemeClr val="accent1"/>
+                </a:solidFill>
+                <a:highlight>
+                  <a:srgbClr val="000000"/>
+                </a:highlight>
+                <a:latin typeface="Consolas" panose="020B0609020204030204" pitchFamily="49" charset="0"/>
+              </a:rPr>
+            </a:br>
+            <a:r>
+              <a:rPr lang="en-US" sz="1800" dirty="0" err="1">
+                <a:solidFill>
+                  <a:schemeClr val="accent1"/>
+                </a:solidFill>
+                <a:highlight>
+                  <a:srgbClr val="000000"/>
+                </a:highlight>
+                <a:latin typeface="Consolas" panose="020B0609020204030204" pitchFamily="49" charset="0"/>
+              </a:rPr>
+              <a:t>dotnet</a:t>
+            </a:r>
+            <a:r>
+              <a:rPr lang="en-US" sz="1800" dirty="0">
+                <a:solidFill>
+                  <a:schemeClr val="accent1"/>
+                </a:solidFill>
+                <a:highlight>
+                  <a:srgbClr val="000000"/>
+                </a:highlight>
+                <a:latin typeface="Consolas" panose="020B0609020204030204" pitchFamily="49" charset="0"/>
+              </a:rPr>
+              <a:t> publish</a:t>
+            </a:r>
+          </a:p>
+          <a:p>
+            <a:r>
+              <a:rPr lang="en-US" dirty="0"/>
+              <a:t>Add </a:t>
+            </a:r>
+            <a:r>
+              <a:rPr lang="en-US" dirty="0" err="1"/>
+              <a:t>dockerfile</a:t>
+            </a:r>
+            <a:endParaRPr lang="en-US" dirty="0"/>
+          </a:p>
+          <a:p>
+            <a:r>
+              <a:rPr lang="en-US" sz="1800" dirty="0" err="1">
                 <a:solidFill>
                   <a:schemeClr val="accent1"/>
                 </a:solidFill>
@@ -12736,7 +12858,7 @@
               <a:t>docker</a:t>
             </a:r>
             <a:r>
-              <a:rPr lang="en-US" sz="1900" dirty="0">
+              <a:rPr lang="en-US" sz="1800" dirty="0">
                 <a:solidFill>
                   <a:schemeClr val="accent1"/>
                 </a:solidFill>
@@ -12745,10 +12867,10 @@
                 </a:highlight>
                 <a:latin typeface="Consolas" panose="020B0609020204030204" pitchFamily="49" charset="0"/>
               </a:rPr>
-              <a:t> pull </a:t>
-            </a:r>
-            <a:r>
-              <a:rPr lang="en-US" sz="1900" dirty="0" err="1">
+              <a:t> build -t site2 .</a:t>
+            </a:r>
+            <a:br>
+              <a:rPr lang="en-US" sz="1800" dirty="0">
                 <a:solidFill>
                   <a:schemeClr val="accent1"/>
                 </a:solidFill>
@@ -12757,55 +12879,9 @@
                 </a:highlight>
                 <a:latin typeface="Consolas" panose="020B0609020204030204" pitchFamily="49" charset="0"/>
               </a:rPr>
-              <a:t>microsoft</a:t>
-            </a:r>
-            <a:r>
-              <a:rPr lang="en-US" sz="1900" dirty="0">
-                <a:solidFill>
-                  <a:schemeClr val="accent1"/>
-                </a:solidFill>
-                <a:highlight>
-                  <a:srgbClr val="000000"/>
-                </a:highlight>
-                <a:latin typeface="Consolas" panose="020B0609020204030204" pitchFamily="49" charset="0"/>
-              </a:rPr>
-              <a:t>/</a:t>
-            </a:r>
-            <a:r>
-              <a:rPr lang="en-US" sz="1900" dirty="0" err="1">
-                <a:solidFill>
-                  <a:schemeClr val="accent1"/>
-                </a:solidFill>
-                <a:highlight>
-                  <a:srgbClr val="000000"/>
-                </a:highlight>
-                <a:latin typeface="Consolas" panose="020B0609020204030204" pitchFamily="49" charset="0"/>
-              </a:rPr>
-              <a:t>nanoserver</a:t>
-            </a:r>
-            <a:r>
-              <a:rPr lang="en-US" sz="1900" dirty="0">
-                <a:solidFill>
-                  <a:schemeClr val="accent1"/>
-                </a:solidFill>
-                <a:latin typeface="Consolas" panose="020B0609020204030204" pitchFamily="49" charset="0"/>
-              </a:rPr>
-              <a:t> </a:t>
-            </a:r>
-            <a:r>
-              <a:rPr lang="en-US" sz="1900" dirty="0"/>
-              <a:t>(pull down image)</a:t>
-            </a:r>
-            <a:endParaRPr lang="en-US" sz="1900" dirty="0">
-              <a:solidFill>
-                <a:schemeClr val="accent1"/>
-              </a:solidFill>
-              <a:latin typeface="Consolas" panose="020B0609020204030204" pitchFamily="49" charset="0"/>
-            </a:endParaRPr>
-          </a:p>
-          <a:p>
-            <a:r>
-              <a:rPr lang="en-US" sz="1900" dirty="0" err="1">
+            </a:br>
+            <a:r>
+              <a:rPr lang="en-US" sz="1800" dirty="0" err="1">
                 <a:solidFill>
                   <a:schemeClr val="accent1"/>
                 </a:solidFill>
@@ -12817,7 +12893,7 @@
               <a:t>docker</a:t>
             </a:r>
             <a:r>
-              <a:rPr lang="en-US" sz="1900" dirty="0">
+              <a:rPr lang="en-US" sz="1800" dirty="0">
                 <a:solidFill>
                   <a:schemeClr val="accent1"/>
                 </a:solidFill>
@@ -12826,10 +12902,10 @@
                 </a:highlight>
                 <a:latin typeface="Consolas" panose="020B0609020204030204" pitchFamily="49" charset="0"/>
               </a:rPr>
-              <a:t> run -it </a:t>
-            </a:r>
-            <a:r>
-              <a:rPr lang="en-US" sz="1900" dirty="0" err="1">
+              <a:t> run -d -p 5000:5000 --name site2 </a:t>
+            </a:r>
+            <a:r>
+              <a:rPr lang="en-US" sz="1800" dirty="0" err="1">
                 <a:solidFill>
                   <a:schemeClr val="accent1"/>
                 </a:solidFill>
@@ -12838,10 +12914,10 @@
                 </a:highlight>
                 <a:latin typeface="Consolas" panose="020B0609020204030204" pitchFamily="49" charset="0"/>
               </a:rPr>
-              <a:t>microsoft</a:t>
-            </a:r>
-            <a:r>
-              <a:rPr lang="en-US" sz="1900" dirty="0">
+              <a:t>site2</a:t>
+            </a:r>
+            <a:br>
+              <a:rPr lang="en-US" sz="1800" dirty="0">
                 <a:solidFill>
                   <a:schemeClr val="accent1"/>
                 </a:solidFill>
@@ -12850,10 +12926,9 @@
                 </a:highlight>
                 <a:latin typeface="Consolas" panose="020B0609020204030204" pitchFamily="49" charset="0"/>
               </a:rPr>
-              <a:t>/</a:t>
-            </a:r>
-            <a:r>
-              <a:rPr lang="en-US" sz="1900" dirty="0" err="1">
+            </a:br>
+            <a:r>
+              <a:rPr lang="en-US" sz="1800" dirty="0" err="1">
                 <a:solidFill>
                   <a:schemeClr val="accent1"/>
                 </a:solidFill>
@@ -12862,10 +12937,69 @@
                 </a:highlight>
                 <a:latin typeface="Consolas" panose="020B0609020204030204" pitchFamily="49" charset="0"/>
               </a:rPr>
-              <a:t>nanoserver</a:t>
-            </a:r>
-            <a:r>
-              <a:rPr lang="en-US" sz="1900" dirty="0">
+              <a:t>docker</a:t>
+            </a:r>
+            <a:r>
+              <a:rPr lang="en-US" sz="1800" dirty="0">
+                <a:solidFill>
+                  <a:schemeClr val="accent1"/>
+                </a:solidFill>
+                <a:highlight>
+                  <a:srgbClr val="000000"/>
+                </a:highlight>
+                <a:latin typeface="Consolas" panose="020B0609020204030204" pitchFamily="49" charset="0"/>
+              </a:rPr>
+              <a:t> inspect -f "{{ .</a:t>
+            </a:r>
+            <a:r>
+              <a:rPr lang="en-US" sz="1800" dirty="0" err="1">
+                <a:solidFill>
+                  <a:schemeClr val="accent1"/>
+                </a:solidFill>
+                <a:highlight>
+                  <a:srgbClr val="000000"/>
+                </a:highlight>
+                <a:latin typeface="Consolas" panose="020B0609020204030204" pitchFamily="49" charset="0"/>
+              </a:rPr>
+              <a:t>NetworkSettings.Networks.nat.IPAddress</a:t>
+            </a:r>
+            <a:r>
+              <a:rPr lang="en-US" sz="1800" dirty="0">
+                <a:solidFill>
+                  <a:schemeClr val="accent1"/>
+                </a:solidFill>
+                <a:highlight>
+                  <a:srgbClr val="000000"/>
+                </a:highlight>
+                <a:latin typeface="Consolas" panose="020B0609020204030204" pitchFamily="49" charset="0"/>
+              </a:rPr>
+              <a:t> }}" site2 </a:t>
+            </a:r>
+            <a:br>
+              <a:rPr lang="en-US" sz="1800" dirty="0">
+                <a:solidFill>
+                  <a:schemeClr val="accent1"/>
+                </a:solidFill>
+                <a:highlight>
+                  <a:srgbClr val="000000"/>
+                </a:highlight>
+                <a:latin typeface="Consolas" panose="020B0609020204030204" pitchFamily="49" charset="0"/>
+              </a:rPr>
+            </a:br>
+            <a:r>
+              <a:rPr lang="en-US" sz="1800" dirty="0" err="1">
+                <a:solidFill>
+                  <a:schemeClr val="accent1"/>
+                </a:solidFill>
+                <a:highlight>
+                  <a:srgbClr val="000000"/>
+                </a:highlight>
+                <a:latin typeface="Consolas" panose="020B0609020204030204" pitchFamily="49" charset="0"/>
+              </a:rPr>
+              <a:t>docker</a:t>
+            </a:r>
+            <a:r>
+              <a:rPr lang="en-US" sz="1800" dirty="0">
                 <a:solidFill>
                   <a:schemeClr val="accent1"/>
                 </a:solidFill>
@@ -12877,172 +13011,7 @@
               <a:t> </a:t>
             </a:r>
             <a:r>
-              <a:rPr lang="en-US" sz="1900" dirty="0" err="1">
-                <a:solidFill>
-                  <a:schemeClr val="accent1"/>
-                </a:solidFill>
-                <a:highlight>
-                  <a:srgbClr val="000000"/>
-                </a:highlight>
-                <a:latin typeface="Consolas" panose="020B0609020204030204" pitchFamily="49" charset="0"/>
-              </a:rPr>
-              <a:t>cmd</a:t>
-            </a:r>
-            <a:r>
-              <a:rPr lang="en-US" sz="1900" dirty="0">
-                <a:solidFill>
-                  <a:schemeClr val="accent1"/>
-                </a:solidFill>
-                <a:latin typeface="Consolas" panose="020B0609020204030204" pitchFamily="49" charset="0"/>
-              </a:rPr>
-              <a:t> </a:t>
-            </a:r>
-            <a:r>
-              <a:rPr lang="en-US" sz="1900" dirty="0"/>
-              <a:t>(run command inside image)</a:t>
-            </a:r>
-            <a:endParaRPr lang="en-US" sz="1900" dirty="0">
-              <a:solidFill>
-                <a:schemeClr val="accent1"/>
-              </a:solidFill>
-              <a:latin typeface="Consolas" panose="020B0609020204030204" pitchFamily="49" charset="0"/>
-            </a:endParaRPr>
-          </a:p>
-          <a:p>
-            <a:pPr lvl="1"/>
-            <a:r>
-              <a:rPr lang="en-US" sz="1500" dirty="0">
-                <a:highlight>
-                  <a:srgbClr val="000000"/>
-                </a:highlight>
-                <a:latin typeface="Consolas" panose="020B0609020204030204" pitchFamily="49" charset="0"/>
-              </a:rPr>
-              <a:t>powershell.exe Add-Content C:\helloworld.ps1 'Write-Host "Hello World from </a:t>
-            </a:r>
-            <a:r>
-              <a:rPr lang="en-US" sz="1500" dirty="0" err="1">
-                <a:highlight>
-                  <a:srgbClr val="000000"/>
-                </a:highlight>
-                <a:latin typeface="Consolas" panose="020B0609020204030204" pitchFamily="49" charset="0"/>
-              </a:rPr>
-              <a:t>Powershell</a:t>
-            </a:r>
-            <a:r>
-              <a:rPr lang="en-US" sz="1500" dirty="0">
-                <a:highlight>
-                  <a:srgbClr val="000000"/>
-                </a:highlight>
-                <a:latin typeface="Consolas" panose="020B0609020204030204" pitchFamily="49" charset="0"/>
-              </a:rPr>
-              <a:t>"'</a:t>
-            </a:r>
-          </a:p>
-          <a:p>
-            <a:pPr lvl="1"/>
-            <a:r>
-              <a:rPr lang="en-US" sz="1500" dirty="0">
-                <a:highlight>
-                  <a:srgbClr val="000000"/>
-                </a:highlight>
-                <a:latin typeface="Consolas" panose="020B0609020204030204" pitchFamily="49" charset="0"/>
-              </a:rPr>
-              <a:t>exit</a:t>
-            </a:r>
-            <a:endParaRPr lang="en-US" sz="1900" dirty="0">
-              <a:highlight>
-                <a:srgbClr val="000000"/>
-              </a:highlight>
-              <a:latin typeface="Consolas" panose="020B0609020204030204" pitchFamily="49" charset="0"/>
-            </a:endParaRPr>
-          </a:p>
-          <a:p>
-            <a:r>
-              <a:rPr lang="en-US" sz="1900" dirty="0" err="1">
-                <a:solidFill>
-                  <a:schemeClr val="accent1"/>
-                </a:solidFill>
-                <a:highlight>
-                  <a:srgbClr val="000000"/>
-                </a:highlight>
-                <a:latin typeface="Consolas" panose="020B0609020204030204" pitchFamily="49" charset="0"/>
-              </a:rPr>
-              <a:t>docker</a:t>
-            </a:r>
-            <a:r>
-              <a:rPr lang="en-US" sz="1900" dirty="0">
-                <a:solidFill>
-                  <a:schemeClr val="accent1"/>
-                </a:solidFill>
-                <a:highlight>
-                  <a:srgbClr val="000000"/>
-                </a:highlight>
-                <a:latin typeface="Consolas" panose="020B0609020204030204" pitchFamily="49" charset="0"/>
-              </a:rPr>
-              <a:t> commit {container hash} </a:t>
-            </a:r>
-            <a:r>
-              <a:rPr lang="en-US" sz="1900" dirty="0" err="1">
-                <a:solidFill>
-                  <a:schemeClr val="accent1"/>
-                </a:solidFill>
-                <a:highlight>
-                  <a:srgbClr val="000000"/>
-                </a:highlight>
-                <a:latin typeface="Consolas" panose="020B0609020204030204" pitchFamily="49" charset="0"/>
-              </a:rPr>
-              <a:t>helloworld</a:t>
-            </a:r>
-            <a:r>
-              <a:rPr lang="en-US" sz="1900" dirty="0">
-                <a:solidFill>
-                  <a:schemeClr val="accent1"/>
-                </a:solidFill>
-                <a:latin typeface="Consolas" panose="020B0609020204030204" pitchFamily="49" charset="0"/>
-              </a:rPr>
-              <a:t> </a:t>
-            </a:r>
-            <a:r>
-              <a:rPr lang="en-US" sz="1900" dirty="0"/>
-              <a:t>(stores changes as new image)</a:t>
-            </a:r>
-            <a:endParaRPr lang="en-US" sz="1900" dirty="0">
-              <a:solidFill>
-                <a:schemeClr val="accent1"/>
-              </a:solidFill>
-              <a:highlight>
-                <a:srgbClr val="000000"/>
-              </a:highlight>
-              <a:latin typeface="Consolas" panose="020B0609020204030204" pitchFamily="49" charset="0"/>
-            </a:endParaRPr>
-          </a:p>
-          <a:p>
-            <a:r>
-              <a:rPr lang="en-US" sz="1900" dirty="0" err="1">
-                <a:solidFill>
-                  <a:schemeClr val="accent1"/>
-                </a:solidFill>
-                <a:highlight>
-                  <a:srgbClr val="000000"/>
-                </a:highlight>
-                <a:latin typeface="Consolas" panose="020B0609020204030204" pitchFamily="49" charset="0"/>
-              </a:rPr>
-              <a:t>docker</a:t>
-            </a:r>
-            <a:r>
-              <a:rPr lang="en-US" sz="1900" dirty="0">
-                <a:solidFill>
-                  <a:schemeClr val="accent1"/>
-                </a:solidFill>
-                <a:highlight>
-                  <a:srgbClr val="000000"/>
-                </a:highlight>
-                <a:latin typeface="Consolas" panose="020B0609020204030204" pitchFamily="49" charset="0"/>
-              </a:rPr>
-              <a:t> run --</a:t>
-            </a:r>
-            <a:r>
-              <a:rPr lang="en-US" sz="1900" dirty="0" err="1">
+              <a:rPr lang="en-US" sz="1800" dirty="0" err="1">
                 <a:solidFill>
                   <a:schemeClr val="accent1"/>
                 </a:solidFill>
@@ -13054,7 +13023,7 @@
               <a:t>rm</a:t>
             </a:r>
             <a:r>
-              <a:rPr lang="en-US" sz="1900" dirty="0">
+              <a:rPr lang="en-US" sz="1800" dirty="0">
                 <a:solidFill>
                   <a:schemeClr val="accent1"/>
                 </a:solidFill>
@@ -13063,110 +13032,11 @@
                 </a:highlight>
                 <a:latin typeface="Consolas" panose="020B0609020204030204" pitchFamily="49" charset="0"/>
               </a:rPr>
-              <a:t> </a:t>
-            </a:r>
-            <a:r>
-              <a:rPr lang="en-US" sz="1900" dirty="0" err="1">
-                <a:solidFill>
-                  <a:schemeClr val="accent1"/>
-                </a:solidFill>
-                <a:highlight>
-                  <a:srgbClr val="000000"/>
-                </a:highlight>
-                <a:latin typeface="Consolas" panose="020B0609020204030204" pitchFamily="49" charset="0"/>
-              </a:rPr>
-              <a:t>helloworld</a:t>
-            </a:r>
-            <a:r>
-              <a:rPr lang="en-US" sz="1900" dirty="0">
-                <a:solidFill>
-                  <a:schemeClr val="accent1"/>
-                </a:solidFill>
-                <a:highlight>
-                  <a:srgbClr val="000000"/>
-                </a:highlight>
-                <a:latin typeface="Consolas" panose="020B0609020204030204" pitchFamily="49" charset="0"/>
-              </a:rPr>
-              <a:t> </a:t>
-            </a:r>
-            <a:r>
-              <a:rPr lang="en-US" sz="1900" dirty="0" err="1">
-                <a:solidFill>
-                  <a:schemeClr val="accent1"/>
-                </a:solidFill>
-                <a:highlight>
-                  <a:srgbClr val="000000"/>
-                </a:highlight>
-                <a:latin typeface="Consolas" panose="020B0609020204030204" pitchFamily="49" charset="0"/>
-              </a:rPr>
-              <a:t>powershell</a:t>
-            </a:r>
-            <a:r>
-              <a:rPr lang="en-US" sz="1900" dirty="0">
-                <a:solidFill>
-                  <a:schemeClr val="accent1"/>
-                </a:solidFill>
-                <a:highlight>
-                  <a:srgbClr val="000000"/>
-                </a:highlight>
-                <a:latin typeface="Consolas" panose="020B0609020204030204" pitchFamily="49" charset="0"/>
-              </a:rPr>
-              <a:t> c:\helloworld.ps1</a:t>
-            </a:r>
-          </a:p>
-          <a:p>
-            <a:pPr lvl="1"/>
-            <a:r>
-              <a:rPr lang="en-US" sz="2200" dirty="0"/>
-              <a:t>Note the </a:t>
-            </a:r>
-            <a:r>
-              <a:rPr lang="en-US" sz="1500" dirty="0">
-                <a:solidFill>
-                  <a:schemeClr val="accent1"/>
-                </a:solidFill>
-                <a:highlight>
-                  <a:srgbClr val="000000"/>
-                </a:highlight>
-                <a:latin typeface="Consolas" panose="020B0609020204030204" pitchFamily="49" charset="0"/>
-              </a:rPr>
-              <a:t>--</a:t>
-            </a:r>
-            <a:r>
-              <a:rPr lang="en-US" sz="1500" dirty="0" err="1">
-                <a:solidFill>
-                  <a:schemeClr val="accent1"/>
-                </a:solidFill>
-                <a:highlight>
-                  <a:srgbClr val="000000"/>
-                </a:highlight>
-                <a:latin typeface="Consolas" panose="020B0609020204030204" pitchFamily="49" charset="0"/>
-              </a:rPr>
-              <a:t>rm</a:t>
-            </a:r>
-            <a:r>
-              <a:rPr lang="en-US" sz="2200" dirty="0"/>
-              <a:t> removes the container when it has completed</a:t>
+              <a:t> -f site2</a:t>
             </a:r>
           </a:p>
           <a:p>
             <a:endParaRPr lang="en-US" dirty="0"/>
-          </a:p>
-          <a:p>
-            <a:pPr marL="0" indent="0">
-              <a:buNone/>
-            </a:pPr>
-            <a:r>
-              <a:rPr lang="en-US" sz="1600" dirty="0"/>
-              <a:t>Source: </a:t>
-            </a:r>
-            <a:r>
-              <a:rPr lang="en-US" sz="1600" dirty="0">
-                <a:hlinkClick r:id="rId2"/>
-              </a:rPr>
-              <a:t>https://msdn.microsoft.com/en-us/virtualization/windowscontainers/quick_start/quick_start_windows_10</a:t>
-            </a:r>
-            <a:endParaRPr lang="en-US" sz="1600" dirty="0"/>
           </a:p>
           <a:p>
             <a:endParaRPr lang="en-US" dirty="0"/>
@@ -13176,7 +13046,7 @@
     </p:spTree>
     <p:extLst>
       <p:ext uri="{BB962C8B-B14F-4D97-AF65-F5344CB8AC3E}">
-        <p14:creationId xmlns:p14="http://schemas.microsoft.com/office/powerpoint/2010/main" val="1721733695"/>
+        <p14:creationId xmlns:p14="http://schemas.microsoft.com/office/powerpoint/2010/main" val="1187050348"/>
       </p:ext>
     </p:extLst>
   </p:cSld>
@@ -13213,421 +13083,6 @@
             <p:ph idx="1"/>
           </p:nvPr>
         </p:nvSpPr>
-        <p:spPr>
-          <a:xfrm>
-            <a:off x="723014" y="725214"/>
-            <a:ext cx="11344940" cy="5065987"/>
-          </a:xfrm>
-        </p:spPr>
-        <p:txBody>
-          <a:bodyPr>
-            <a:normAutofit/>
-          </a:bodyPr>
-          <a:lstStyle/>
-          <a:p>
-            <a:pPr marL="0" indent="0">
-              <a:buNone/>
-            </a:pPr>
-            <a:r>
-              <a:rPr lang="en-US" dirty="0">
-                <a:solidFill>
-                  <a:schemeClr val="bg1"/>
-                </a:solidFill>
-              </a:rPr>
-              <a:t>Asp.net Core with Windows Container</a:t>
-            </a:r>
-          </a:p>
-          <a:p>
-            <a:r>
-              <a:rPr lang="en-US" sz="1900" dirty="0" err="1">
-                <a:solidFill>
-                  <a:schemeClr val="accent1"/>
-                </a:solidFill>
-                <a:highlight>
-                  <a:srgbClr val="000000"/>
-                </a:highlight>
-                <a:latin typeface="Consolas" panose="020B0609020204030204" pitchFamily="49" charset="0"/>
-              </a:rPr>
-              <a:t>dotnet</a:t>
-            </a:r>
-            <a:r>
-              <a:rPr lang="en-US" sz="1900" dirty="0">
-                <a:solidFill>
-                  <a:schemeClr val="accent1"/>
-                </a:solidFill>
-                <a:highlight>
-                  <a:srgbClr val="000000"/>
-                </a:highlight>
-                <a:latin typeface="Consolas" panose="020B0609020204030204" pitchFamily="49" charset="0"/>
-              </a:rPr>
-              <a:t> new</a:t>
-            </a:r>
-          </a:p>
-          <a:p>
-            <a:r>
-              <a:rPr lang="en-US" dirty="0"/>
-              <a:t>Update </a:t>
-            </a:r>
-            <a:r>
-              <a:rPr lang="en-US" dirty="0" err="1"/>
-              <a:t>project.json</a:t>
-            </a:r>
-            <a:r>
-              <a:rPr lang="en-US" dirty="0"/>
-              <a:t> and </a:t>
-            </a:r>
-            <a:r>
-              <a:rPr lang="en-US" dirty="0" err="1"/>
-              <a:t>Program.cs</a:t>
-            </a:r>
-            <a:endParaRPr lang="en-US" dirty="0"/>
-          </a:p>
-          <a:p>
-            <a:r>
-              <a:rPr lang="en-US" sz="1800" dirty="0" err="1">
-                <a:solidFill>
-                  <a:schemeClr val="accent1"/>
-                </a:solidFill>
-                <a:highlight>
-                  <a:srgbClr val="000000"/>
-                </a:highlight>
-                <a:latin typeface="Consolas" panose="020B0609020204030204" pitchFamily="49" charset="0"/>
-              </a:rPr>
-              <a:t>dotnet</a:t>
-            </a:r>
-            <a:r>
-              <a:rPr lang="en-US" sz="1800" dirty="0">
-                <a:solidFill>
-                  <a:schemeClr val="accent1"/>
-                </a:solidFill>
-                <a:highlight>
-                  <a:srgbClr val="000000"/>
-                </a:highlight>
-                <a:latin typeface="Consolas" panose="020B0609020204030204" pitchFamily="49" charset="0"/>
-              </a:rPr>
-              <a:t> restore</a:t>
-            </a:r>
-            <a:br>
-              <a:rPr lang="en-US" sz="1800" dirty="0">
-                <a:solidFill>
-                  <a:schemeClr val="accent1"/>
-                </a:solidFill>
-                <a:highlight>
-                  <a:srgbClr val="000000"/>
-                </a:highlight>
-                <a:latin typeface="Consolas" panose="020B0609020204030204" pitchFamily="49" charset="0"/>
-              </a:rPr>
-            </a:br>
-            <a:r>
-              <a:rPr lang="en-US" sz="1800" dirty="0" err="1">
-                <a:solidFill>
-                  <a:schemeClr val="accent1"/>
-                </a:solidFill>
-                <a:highlight>
-                  <a:srgbClr val="000000"/>
-                </a:highlight>
-                <a:latin typeface="Consolas" panose="020B0609020204030204" pitchFamily="49" charset="0"/>
-              </a:rPr>
-              <a:t>dotnet</a:t>
-            </a:r>
-            <a:r>
-              <a:rPr lang="en-US" sz="1800" dirty="0">
-                <a:solidFill>
-                  <a:schemeClr val="accent1"/>
-                </a:solidFill>
-                <a:highlight>
-                  <a:srgbClr val="000000"/>
-                </a:highlight>
-                <a:latin typeface="Consolas" panose="020B0609020204030204" pitchFamily="49" charset="0"/>
-              </a:rPr>
-              <a:t> run</a:t>
-            </a:r>
-            <a:br>
-              <a:rPr lang="en-US" sz="1800" dirty="0">
-                <a:solidFill>
-                  <a:schemeClr val="accent1"/>
-                </a:solidFill>
-                <a:highlight>
-                  <a:srgbClr val="000000"/>
-                </a:highlight>
-                <a:latin typeface="Consolas" panose="020B0609020204030204" pitchFamily="49" charset="0"/>
-              </a:rPr>
-            </a:br>
-            <a:r>
-              <a:rPr lang="en-US" sz="1800" dirty="0" err="1">
-                <a:solidFill>
-                  <a:schemeClr val="accent1"/>
-                </a:solidFill>
-                <a:highlight>
-                  <a:srgbClr val="000000"/>
-                </a:highlight>
-                <a:latin typeface="Consolas" panose="020B0609020204030204" pitchFamily="49" charset="0"/>
-              </a:rPr>
-              <a:t>dotnet</a:t>
-            </a:r>
-            <a:r>
-              <a:rPr lang="en-US" sz="1800" dirty="0">
-                <a:solidFill>
-                  <a:schemeClr val="accent1"/>
-                </a:solidFill>
-                <a:highlight>
-                  <a:srgbClr val="000000"/>
-                </a:highlight>
-                <a:latin typeface="Consolas" panose="020B0609020204030204" pitchFamily="49" charset="0"/>
-              </a:rPr>
-              <a:t> publish</a:t>
-            </a:r>
-          </a:p>
-          <a:p>
-            <a:r>
-              <a:rPr lang="en-US" dirty="0"/>
-              <a:t>Add </a:t>
-            </a:r>
-            <a:r>
-              <a:rPr lang="en-US" dirty="0" err="1"/>
-              <a:t>dockerfile</a:t>
-            </a:r>
-            <a:endParaRPr lang="en-US" dirty="0"/>
-          </a:p>
-          <a:p>
-            <a:r>
-              <a:rPr lang="en-US" sz="1800" dirty="0" err="1">
-                <a:solidFill>
-                  <a:schemeClr val="accent1"/>
-                </a:solidFill>
-                <a:highlight>
-                  <a:srgbClr val="000000"/>
-                </a:highlight>
-                <a:latin typeface="Consolas" panose="020B0609020204030204" pitchFamily="49" charset="0"/>
-              </a:rPr>
-              <a:t>docker</a:t>
-            </a:r>
-            <a:r>
-              <a:rPr lang="en-US" sz="1800" dirty="0">
-                <a:solidFill>
-                  <a:schemeClr val="accent1"/>
-                </a:solidFill>
-                <a:highlight>
-                  <a:srgbClr val="000000"/>
-                </a:highlight>
-                <a:latin typeface="Consolas" panose="020B0609020204030204" pitchFamily="49" charset="0"/>
-              </a:rPr>
-              <a:t> build -t site2 .</a:t>
-            </a:r>
-            <a:br>
-              <a:rPr lang="en-US" sz="1800" dirty="0">
-                <a:solidFill>
-                  <a:schemeClr val="accent1"/>
-                </a:solidFill>
-                <a:highlight>
-                  <a:srgbClr val="000000"/>
-                </a:highlight>
-                <a:latin typeface="Consolas" panose="020B0609020204030204" pitchFamily="49" charset="0"/>
-              </a:rPr>
-            </a:br>
-            <a:r>
-              <a:rPr lang="en-US" sz="1800" dirty="0" err="1">
-                <a:solidFill>
-                  <a:schemeClr val="accent1"/>
-                </a:solidFill>
-                <a:highlight>
-                  <a:srgbClr val="000000"/>
-                </a:highlight>
-                <a:latin typeface="Consolas" panose="020B0609020204030204" pitchFamily="49" charset="0"/>
-              </a:rPr>
-              <a:t>docker</a:t>
-            </a:r>
-            <a:r>
-              <a:rPr lang="en-US" sz="1800" dirty="0">
-                <a:solidFill>
-                  <a:schemeClr val="accent1"/>
-                </a:solidFill>
-                <a:highlight>
-                  <a:srgbClr val="000000"/>
-                </a:highlight>
-                <a:latin typeface="Consolas" panose="020B0609020204030204" pitchFamily="49" charset="0"/>
-              </a:rPr>
-              <a:t> run -d -p 5000:5000 --name site2 </a:t>
-            </a:r>
-            <a:r>
-              <a:rPr lang="en-US" sz="1800" dirty="0" err="1">
-                <a:solidFill>
-                  <a:schemeClr val="accent1"/>
-                </a:solidFill>
-                <a:highlight>
-                  <a:srgbClr val="000000"/>
-                </a:highlight>
-                <a:latin typeface="Consolas" panose="020B0609020204030204" pitchFamily="49" charset="0"/>
-              </a:rPr>
-              <a:t>site2</a:t>
-            </a:r>
-            <a:br>
-              <a:rPr lang="en-US" sz="1800" dirty="0">
-                <a:solidFill>
-                  <a:schemeClr val="accent1"/>
-                </a:solidFill>
-                <a:highlight>
-                  <a:srgbClr val="000000"/>
-                </a:highlight>
-                <a:latin typeface="Consolas" panose="020B0609020204030204" pitchFamily="49" charset="0"/>
-              </a:rPr>
-            </a:br>
-            <a:r>
-              <a:rPr lang="en-US" sz="1800" dirty="0" err="1">
-                <a:solidFill>
-                  <a:schemeClr val="accent1"/>
-                </a:solidFill>
-                <a:highlight>
-                  <a:srgbClr val="000000"/>
-                </a:highlight>
-                <a:latin typeface="Consolas" panose="020B0609020204030204" pitchFamily="49" charset="0"/>
-              </a:rPr>
-              <a:t>docker</a:t>
-            </a:r>
-            <a:r>
-              <a:rPr lang="en-US" sz="1800" dirty="0">
-                <a:solidFill>
-                  <a:schemeClr val="accent1"/>
-                </a:solidFill>
-                <a:highlight>
-                  <a:srgbClr val="000000"/>
-                </a:highlight>
-                <a:latin typeface="Consolas" panose="020B0609020204030204" pitchFamily="49" charset="0"/>
-              </a:rPr>
-              <a:t> inspect -f "{{ .</a:t>
-            </a:r>
-            <a:r>
-              <a:rPr lang="en-US" sz="1800" dirty="0" err="1">
-                <a:solidFill>
-                  <a:schemeClr val="accent1"/>
-                </a:solidFill>
-                <a:highlight>
-                  <a:srgbClr val="000000"/>
-                </a:highlight>
-                <a:latin typeface="Consolas" panose="020B0609020204030204" pitchFamily="49" charset="0"/>
-              </a:rPr>
-              <a:t>NetworkSettings.Networks.nat.IPAddress</a:t>
-            </a:r>
-            <a:r>
-              <a:rPr lang="en-US" sz="1800" dirty="0">
-                <a:solidFill>
-                  <a:schemeClr val="accent1"/>
-                </a:solidFill>
-                <a:highlight>
-                  <a:srgbClr val="000000"/>
-                </a:highlight>
-                <a:latin typeface="Consolas" panose="020B0609020204030204" pitchFamily="49" charset="0"/>
-              </a:rPr>
-              <a:t> }}" site2 </a:t>
-            </a:r>
-            <a:br>
-              <a:rPr lang="en-US" sz="1800" dirty="0">
-                <a:solidFill>
-                  <a:schemeClr val="accent1"/>
-                </a:solidFill>
-                <a:highlight>
-                  <a:srgbClr val="000000"/>
-                </a:highlight>
-                <a:latin typeface="Consolas" panose="020B0609020204030204" pitchFamily="49" charset="0"/>
-              </a:rPr>
-            </a:br>
-            <a:r>
-              <a:rPr lang="en-US" sz="1800" dirty="0" err="1">
-                <a:solidFill>
-                  <a:schemeClr val="accent1"/>
-                </a:solidFill>
-                <a:highlight>
-                  <a:srgbClr val="000000"/>
-                </a:highlight>
-                <a:latin typeface="Consolas" panose="020B0609020204030204" pitchFamily="49" charset="0"/>
-              </a:rPr>
-              <a:t>docker</a:t>
-            </a:r>
-            <a:r>
-              <a:rPr lang="en-US" sz="1800" dirty="0">
-                <a:solidFill>
-                  <a:schemeClr val="accent1"/>
-                </a:solidFill>
-                <a:highlight>
-                  <a:srgbClr val="000000"/>
-                </a:highlight>
-                <a:latin typeface="Consolas" panose="020B0609020204030204" pitchFamily="49" charset="0"/>
-              </a:rPr>
-              <a:t> </a:t>
-            </a:r>
-            <a:r>
-              <a:rPr lang="en-US" sz="1800" dirty="0" err="1">
-                <a:solidFill>
-                  <a:schemeClr val="accent1"/>
-                </a:solidFill>
-                <a:highlight>
-                  <a:srgbClr val="000000"/>
-                </a:highlight>
-                <a:latin typeface="Consolas" panose="020B0609020204030204" pitchFamily="49" charset="0"/>
-              </a:rPr>
-              <a:t>rm</a:t>
-            </a:r>
-            <a:r>
-              <a:rPr lang="en-US" sz="1800" dirty="0">
-                <a:solidFill>
-                  <a:schemeClr val="accent1"/>
-                </a:solidFill>
-                <a:highlight>
-                  <a:srgbClr val="000000"/>
-                </a:highlight>
-                <a:latin typeface="Consolas" panose="020B0609020204030204" pitchFamily="49" charset="0"/>
-              </a:rPr>
-              <a:t> -f site2</a:t>
-            </a:r>
-          </a:p>
-          <a:p>
-            <a:endParaRPr lang="en-US" dirty="0"/>
-          </a:p>
-          <a:p>
-            <a:endParaRPr lang="en-US" dirty="0"/>
-          </a:p>
-        </p:txBody>
-      </p:sp>
-    </p:spTree>
-    <p:extLst>
-      <p:ext uri="{BB962C8B-B14F-4D97-AF65-F5344CB8AC3E}">
-        <p14:creationId xmlns:p14="http://schemas.microsoft.com/office/powerpoint/2010/main" val="1187050348"/>
-      </p:ext>
-    </p:extLst>
-  </p:cSld>
-  <p:clrMapOvr>
-    <a:masterClrMapping/>
-  </p:clrMapOvr>
-</p:sld>
-</file>
-
-<file path=ppt/slides/slide12.xml><?xml version="1.0" encoding="utf-8"?>
-<p:sld xmlns:a="http://schemas.openxmlformats.org/drawingml/2006/main" xmlns:r="http://schemas.openxmlformats.org/officeDocument/2006/relationships" xmlns:p="http://schemas.openxmlformats.org/presentationml/2006/main">
-  <p:cSld>
-    <p:spTree>
-      <p:nvGrpSpPr>
-        <p:cNvPr id="1" name=""/>
-        <p:cNvGrpSpPr/>
-        <p:nvPr/>
-      </p:nvGrpSpPr>
-      <p:grpSpPr>
-        <a:xfrm>
-          <a:off x="0" y="0"/>
-          <a:ext cx="0" cy="0"/>
-          <a:chOff x="0" y="0"/>
-          <a:chExt cx="0" cy="0"/>
-        </a:xfrm>
-      </p:grpSpPr>
-      <p:sp>
-        <p:nvSpPr>
-          <p:cNvPr id="2" name="Content Placeholder 1"/>
-          <p:cNvSpPr>
-            <a:spLocks noGrp="1"/>
-          </p:cNvSpPr>
-          <p:nvPr>
-            <p:ph idx="1"/>
-          </p:nvPr>
-        </p:nvSpPr>
         <p:spPr/>
         <p:txBody>
           <a:bodyPr>
@@ -13665,11 +13120,7 @@
             </a:r>
             <a:r>
               <a:rPr lang="en-US" dirty="0"/>
-              <a:t> to </a:t>
-            </a:r>
-            <a:r>
-              <a:rPr lang="en-US" dirty="0"/>
-              <a:t>AspnetClassicWebsite1</a:t>
+              <a:t> to AspnetClassicWebsite1</a:t>
             </a:r>
             <a:endParaRPr lang="en-US" sz="1900" dirty="0">
               <a:solidFill>
@@ -13916,7 +13367,7 @@
 </p:sld>
 </file>
 
-<file path=ppt/slides/slide13.xml><?xml version="1.0" encoding="utf-8"?>
+<file path=ppt/slides/slide12.xml><?xml version="1.0" encoding="utf-8"?>
 <p:sld xmlns:a="http://schemas.openxmlformats.org/drawingml/2006/main" xmlns:r="http://schemas.openxmlformats.org/officeDocument/2006/relationships" xmlns:p="http://schemas.openxmlformats.org/presentationml/2006/main">
   <p:cSld>
     <p:spTree>
@@ -14183,7 +13634,7 @@
 </p:sld>
 </file>
 
-<file path=ppt/slides/slide14.xml><?xml version="1.0" encoding="utf-8"?>
+<file path=ppt/slides/slide13.xml><?xml version="1.0" encoding="utf-8"?>
 <p:sld xmlns:a="http://schemas.openxmlformats.org/drawingml/2006/main" xmlns:r="http://schemas.openxmlformats.org/officeDocument/2006/relationships" xmlns:p="http://schemas.openxmlformats.org/presentationml/2006/main">
   <p:cSld>
     <p:spTree>
@@ -14304,7 +13755,7 @@
 </p:sld>
 </file>
 
-<file path=ppt/slides/slide15.xml><?xml version="1.0" encoding="utf-8"?>
+<file path=ppt/slides/slide14.xml><?xml version="1.0" encoding="utf-8"?>
 <p:sld xmlns:a="http://schemas.openxmlformats.org/drawingml/2006/main" xmlns:r="http://schemas.openxmlformats.org/officeDocument/2006/relationships" xmlns:p="http://schemas.openxmlformats.org/presentationml/2006/main">
   <p:cSld>
     <p:spTree>
@@ -15572,7 +15023,7 @@
 </file>
 
 <file path=ppt/slides/slide8.xml><?xml version="1.0" encoding="utf-8"?>
-<p:sld xmlns:a="http://schemas.openxmlformats.org/drawingml/2006/main" xmlns:r="http://schemas.openxmlformats.org/officeDocument/2006/relationships" xmlns:p="http://schemas.openxmlformats.org/presentationml/2006/main" show="0">
+<p:sld xmlns:a="http://schemas.openxmlformats.org/drawingml/2006/main" xmlns:r="http://schemas.openxmlformats.org/officeDocument/2006/relationships" xmlns:p="http://schemas.openxmlformats.org/presentationml/2006/main">
   <p:cSld>
     <p:spTree>
       <p:nvGrpSpPr>
@@ -15598,10 +15049,15 @@
             <p:ph idx="1"/>
           </p:nvPr>
         </p:nvSpPr>
-        <p:spPr/>
+        <p:spPr>
+          <a:xfrm>
+            <a:off x="1141412" y="382773"/>
+            <a:ext cx="9905999" cy="6273208"/>
+          </a:xfrm>
+        </p:spPr>
         <p:txBody>
           <a:bodyPr>
-            <a:normAutofit fontScale="92500" lnSpcReduction="10000"/>
+            <a:normAutofit/>
           </a:bodyPr>
           <a:lstStyle/>
           <a:p>
@@ -15609,54 +15065,121 @@
               <a:buNone/>
             </a:pPr>
             <a:r>
-              <a:rPr lang="en-US" sz="3000" dirty="0">
+              <a:rPr lang="en-US" dirty="0">
                 <a:solidFill>
                   <a:schemeClr val="bg1"/>
                 </a:solidFill>
               </a:rPr>
-              <a:t>Docker Process</a:t>
-            </a:r>
-            <a:endParaRPr lang="en-US" dirty="0"/>
-          </a:p>
-          <a:p>
-            <a:pPr marL="457200" indent="-457200">
-              <a:buFont typeface="+mj-lt"/>
-              <a:buAutoNum type="arabicPeriod"/>
-            </a:pPr>
+              <a:t>Asp.net Core with Linux Container</a:t>
+            </a:r>
+          </a:p>
+          <a:p>
             <a:r>
               <a:rPr lang="en-US" dirty="0"/>
               <a:t>Add </a:t>
             </a:r>
             <a:r>
               <a:rPr lang="en-US" dirty="0" err="1"/>
+              <a:t>linux</a:t>
+            </a:r>
+            <a:r>
+              <a:rPr lang="en-US" dirty="0"/>
+              <a:t> </a:t>
+            </a:r>
+            <a:r>
+              <a:rPr lang="en-US" dirty="0" err="1">
+                <a:solidFill>
+                  <a:schemeClr val="bg1"/>
+                </a:solidFill>
+                <a:latin typeface="Consolas" panose="020B0609020204030204" pitchFamily="49" charset="0"/>
+              </a:rPr>
               <a:t>dockerfile</a:t>
             </a:r>
-            <a:endParaRPr lang="en-US" dirty="0"/>
+            <a:r>
+              <a:rPr lang="en-US" dirty="0">
+                <a:solidFill>
+                  <a:schemeClr val="bg1"/>
+                </a:solidFill>
+              </a:rPr>
+              <a:t> </a:t>
+            </a:r>
+            <a:r>
+              <a:rPr lang="en-US" dirty="0"/>
+              <a:t>to AspnetCoreWebsite1</a:t>
+            </a:r>
+            <a:endParaRPr lang="en-US" dirty="0">
+              <a:solidFill>
+                <a:schemeClr val="bg1"/>
+              </a:solidFill>
+            </a:endParaRPr>
           </a:p>
           <a:p>
             <a:pPr lvl="1"/>
             <a:r>
-              <a:rPr lang="en-US" dirty="0"/>
-              <a:t>Instructs </a:t>
-            </a:r>
-            <a:r>
-              <a:rPr lang="en-US" dirty="0" err="1"/>
-              <a:t>docker</a:t>
-            </a:r>
-            <a:r>
-              <a:rPr lang="en-US" dirty="0"/>
-              <a:t> which base image to use, the steps to use to build the image, what to expose to the outside world, and which process to launch and monitor</a:t>
-            </a:r>
-          </a:p>
-          <a:p>
-            <a:pPr marL="457200" indent="-457200">
-              <a:buFont typeface="+mj-lt"/>
-              <a:buAutoNum type="arabicPeriod"/>
-            </a:pPr>
+              <a:rPr lang="en-US" sz="1800" dirty="0" err="1">
+                <a:solidFill>
+                  <a:schemeClr val="accent1"/>
+                </a:solidFill>
+                <a:highlight>
+                  <a:srgbClr val="000000"/>
+                </a:highlight>
+                <a:latin typeface="Consolas" panose="020B0609020204030204" pitchFamily="49" charset="0"/>
+              </a:rPr>
+              <a:t>dotnet</a:t>
+            </a:r>
+            <a:r>
+              <a:rPr lang="en-US" sz="1800" dirty="0">
+                <a:solidFill>
+                  <a:schemeClr val="accent1"/>
+                </a:solidFill>
+                <a:highlight>
+                  <a:srgbClr val="000000"/>
+                </a:highlight>
+                <a:latin typeface="Consolas" panose="020B0609020204030204" pitchFamily="49" charset="0"/>
+              </a:rPr>
+              <a:t> publish</a:t>
+            </a:r>
+          </a:p>
+          <a:p>
             <a:r>
               <a:rPr lang="en-US" dirty="0"/>
               <a:t>Build Image</a:t>
             </a:r>
+          </a:p>
+          <a:p>
+            <a:pPr lvl="1"/>
+            <a:r>
+              <a:rPr lang="en-US" dirty="0">
+                <a:solidFill>
+                  <a:schemeClr val="bg1"/>
+                </a:solidFill>
+              </a:rPr>
+              <a:t>-t</a:t>
+            </a:r>
+            <a:r>
+              <a:rPr lang="en-US" dirty="0"/>
+              <a:t> gives image name (uppercase not allowed)</a:t>
+            </a:r>
+          </a:p>
+          <a:p>
+            <a:pPr lvl="1"/>
+            <a:r>
+              <a:rPr lang="en-US" dirty="0">
+                <a:solidFill>
+                  <a:schemeClr val="bg1"/>
+                </a:solidFill>
+              </a:rPr>
+              <a:t>.</a:t>
+            </a:r>
+            <a:r>
+              <a:rPr lang="en-US" dirty="0"/>
+              <a:t> is context directory (copied to </a:t>
+            </a:r>
+            <a:r>
+              <a:rPr lang="en-US"/>
+              <a:t>working directory)</a:t>
+            </a:r>
+            <a:endParaRPr lang="en-US" dirty="0"/>
           </a:p>
           <a:p>
             <a:pPr lvl="1"/>
@@ -15682,42 +15205,65 @@
                 </a:highlight>
                 <a:latin typeface="Consolas" panose="020B0609020204030204" pitchFamily="49" charset="0"/>
               </a:rPr>
-              <a:t> build -t site1 .</a:t>
-            </a:r>
-            <a:endParaRPr lang="en-US" sz="1800" dirty="0">
-              <a:highlight>
-                <a:srgbClr val="000000"/>
-              </a:highlight>
-            </a:endParaRPr>
+              <a:t> build -t aspnet-core-website1 .</a:t>
+            </a:r>
+          </a:p>
+          <a:p>
+            <a:r>
+              <a:rPr lang="en-US" sz="2000" dirty="0"/>
+              <a:t>Run Image as new Container</a:t>
+            </a:r>
           </a:p>
           <a:p>
             <a:pPr lvl="1"/>
             <a:r>
-              <a:rPr lang="en-US" dirty="0"/>
-              <a:t>Done once to create the reusable binary that contains the application and server configuration</a:t>
+              <a:rPr lang="en-US" sz="1800" dirty="0">
+                <a:solidFill>
+                  <a:schemeClr val="bg1"/>
+                </a:solidFill>
+              </a:rPr>
+              <a:t>-d</a:t>
+            </a:r>
+            <a:r>
+              <a:rPr lang="en-US" sz="1800" dirty="0"/>
+              <a:t> runs as daemon in the background</a:t>
             </a:r>
           </a:p>
           <a:p>
             <a:pPr lvl="1"/>
             <a:r>
-              <a:rPr lang="en-US" dirty="0"/>
-              <a:t>This can be done locally or as part of continuous deployment</a:t>
-            </a:r>
-          </a:p>
-          <a:p>
-            <a:pPr marL="457200" indent="-457200">
-              <a:buFont typeface="+mj-lt"/>
-              <a:buAutoNum type="arabicPeriod"/>
-            </a:pPr>
-            <a:r>
-              <a:rPr lang="en-US" dirty="0"/>
-              <a:t>Run Image</a:t>
+              <a:rPr lang="en-US" sz="1800" dirty="0">
+                <a:solidFill>
+                  <a:schemeClr val="bg1"/>
+                </a:solidFill>
+              </a:rPr>
+              <a:t>-p</a:t>
+            </a:r>
+            <a:r>
+              <a:rPr lang="en-US" sz="1800" dirty="0"/>
+              <a:t> maps external to internal ports</a:t>
             </a:r>
           </a:p>
           <a:p>
             <a:pPr lvl="1"/>
             <a:r>
-              <a:rPr lang="en-US" sz="1900" dirty="0" err="1">
+              <a:rPr lang="en-US" sz="1800" dirty="0">
+                <a:solidFill>
+                  <a:schemeClr val="bg1"/>
+                </a:solidFill>
+              </a:rPr>
+              <a:t>--name</a:t>
+            </a:r>
+            <a:r>
+              <a:rPr lang="en-US" sz="1800" dirty="0"/>
+              <a:t> is container name (each image instance needs separate name)</a:t>
+            </a:r>
+            <a:endParaRPr lang="en-US" sz="1600" dirty="0"/>
+          </a:p>
+          <a:p>
+            <a:pPr lvl="1"/>
+            <a:r>
+              <a:rPr lang="en-US" sz="1700" dirty="0" err="1">
                 <a:solidFill>
                   <a:schemeClr val="accent1"/>
                 </a:solidFill>
@@ -15729,7 +15275,7 @@
               <a:t>docker</a:t>
             </a:r>
             <a:r>
-              <a:rPr lang="en-US" sz="1900" dirty="0">
+              <a:rPr lang="en-US" sz="1700" dirty="0">
                 <a:solidFill>
                   <a:schemeClr val="accent1"/>
                 </a:solidFill>
@@ -15738,10 +15284,10 @@
                 </a:highlight>
                 <a:latin typeface="Consolas" panose="020B0609020204030204" pitchFamily="49" charset="0"/>
               </a:rPr>
-              <a:t> run -d -p 5000:5000 --name site1 </a:t>
-            </a:r>
-            <a:r>
-              <a:rPr lang="en-US" sz="1900" dirty="0" err="1">
+              <a:t> run -d -p 5000:5000 --name aspnet-core-website1 </a:t>
+            </a:r>
+            <a:r>
+              <a:rPr lang="en-US" sz="1700" dirty="0" err="1">
                 <a:solidFill>
                   <a:schemeClr val="accent1"/>
                 </a:solidFill>
@@ -15750,9 +15296,12 @@
                 </a:highlight>
                 <a:latin typeface="Consolas" panose="020B0609020204030204" pitchFamily="49" charset="0"/>
               </a:rPr>
-              <a:t>site1</a:t>
-            </a:r>
-            <a:endParaRPr lang="en-US" sz="1900" dirty="0">
+              <a:t>aspnet-core-website1</a:t>
+            </a:r>
+            <a:endParaRPr lang="en-US" sz="1700" dirty="0">
+              <a:solidFill>
+                <a:schemeClr val="accent1"/>
+              </a:solidFill>
               <a:highlight>
                 <a:srgbClr val="000000"/>
               </a:highlight>
@@ -15762,8 +15311,8 @@
           <a:p>
             <a:pPr lvl="1"/>
             <a:r>
-              <a:rPr lang="en-US" dirty="0"/>
-              <a:t>A single image can be run as multiple instances, but each needs its own name</a:t>
+              <a:rPr lang="en-US" sz="1700" dirty="0"/>
+              <a:t>http://localhost:5000/</a:t>
             </a:r>
           </a:p>
         </p:txBody>
@@ -15771,7 +15320,7 @@
     </p:spTree>
     <p:extLst>
       <p:ext uri="{BB962C8B-B14F-4D97-AF65-F5344CB8AC3E}">
-        <p14:creationId xmlns:p14="http://schemas.microsoft.com/office/powerpoint/2010/main" val="2229985404"/>
+        <p14:creationId xmlns:p14="http://schemas.microsoft.com/office/powerpoint/2010/main" val="3140673228"/>
       </p:ext>
     </p:extLst>
   </p:cSld>
@@ -15810,8 +15359,8 @@
         </p:nvSpPr>
         <p:spPr>
           <a:xfrm>
-            <a:off x="1141412" y="382773"/>
-            <a:ext cx="9905999" cy="6273208"/>
+            <a:off x="899886" y="725214"/>
+            <a:ext cx="11030857" cy="5777186"/>
           </a:xfrm>
         </p:spPr>
         <p:txBody>
@@ -15824,125 +15373,46 @@
               <a:buNone/>
             </a:pPr>
             <a:r>
-              <a:rPr lang="en-US" dirty="0">
+              <a:rPr lang="en-US" sz="3200" dirty="0">
                 <a:solidFill>
                   <a:schemeClr val="bg1"/>
                 </a:solidFill>
               </a:rPr>
-              <a:t>Asp.net Core with Linux Container</a:t>
-            </a:r>
-          </a:p>
-          <a:p>
-            <a:r>
-              <a:rPr lang="en-US" dirty="0"/>
-              <a:t>Add </a:t>
-            </a:r>
-            <a:r>
-              <a:rPr lang="en-US" dirty="0" err="1"/>
-              <a:t>linux</a:t>
-            </a:r>
-            <a:r>
-              <a:rPr lang="en-US" dirty="0"/>
-              <a:t> </a:t>
-            </a:r>
-            <a:r>
-              <a:rPr lang="en-US" dirty="0" err="1">
+              <a:t>Windows container running </a:t>
+            </a:r>
+            <a:r>
+              <a:rPr lang="en-US" sz="3200" dirty="0" err="1">
                 <a:solidFill>
                   <a:schemeClr val="bg1"/>
                 </a:solidFill>
-                <a:latin typeface="Consolas" panose="020B0609020204030204" pitchFamily="49" charset="0"/>
               </a:rPr>
-              <a:t>dockerfile</a:t>
-            </a:r>
-            <a:r>
-              <a:rPr lang="en-US" dirty="0">
+              <a:t>Powershell</a:t>
+            </a:r>
+            <a:r>
+              <a:rPr lang="en-US" sz="3200" dirty="0">
                 <a:solidFill>
                   <a:schemeClr val="bg1"/>
                 </a:solidFill>
               </a:rPr>
-              <a:t> </a:t>
-            </a:r>
-            <a:r>
-              <a:rPr lang="en-US" dirty="0"/>
-              <a:t>to </a:t>
-            </a:r>
-            <a:r>
-              <a:rPr lang="en-US" dirty="0"/>
-              <a:t>AspnetCoreWebsite1</a:t>
-            </a:r>
-            <a:endParaRPr lang="en-US" dirty="0">
-              <a:solidFill>
-                <a:schemeClr val="bg1"/>
-              </a:solidFill>
-            </a:endParaRPr>
+              <a:t> script</a:t>
+            </a:r>
+          </a:p>
+          <a:p>
+            <a:r>
+              <a:rPr lang="en-US" sz="2600" dirty="0"/>
+              <a:t>Linux and Windows images and containers are completely separated</a:t>
+            </a:r>
           </a:p>
           <a:p>
             <a:pPr lvl="1"/>
             <a:r>
-              <a:rPr lang="en-US" sz="1800" dirty="0" err="1">
-                <a:solidFill>
-                  <a:schemeClr val="accent1"/>
-                </a:solidFill>
-                <a:highlight>
-                  <a:srgbClr val="000000"/>
-                </a:highlight>
-                <a:latin typeface="Consolas" panose="020B0609020204030204" pitchFamily="49" charset="0"/>
-              </a:rPr>
-              <a:t>dotnet</a:t>
-            </a:r>
-            <a:r>
-              <a:rPr lang="en-US" sz="1800" dirty="0">
-                <a:solidFill>
-                  <a:schemeClr val="accent1"/>
-                </a:solidFill>
-                <a:highlight>
-                  <a:srgbClr val="000000"/>
-                </a:highlight>
-                <a:latin typeface="Consolas" panose="020B0609020204030204" pitchFamily="49" charset="0"/>
-              </a:rPr>
-              <a:t> publish</a:t>
-            </a:r>
-          </a:p>
-          <a:p>
-            <a:r>
-              <a:rPr lang="en-US" dirty="0"/>
-              <a:t>Build Image</a:t>
-            </a:r>
-          </a:p>
-          <a:p>
-            <a:pPr lvl="1"/>
-            <a:r>
-              <a:rPr lang="en-US" dirty="0">
-                <a:solidFill>
-                  <a:schemeClr val="bg1"/>
-                </a:solidFill>
-              </a:rPr>
-              <a:t>-t</a:t>
-            </a:r>
-            <a:r>
-              <a:rPr lang="en-US" dirty="0"/>
-              <a:t> gives image name (uppercase not allowed)</a:t>
-            </a:r>
-          </a:p>
-          <a:p>
-            <a:pPr lvl="1"/>
-            <a:r>
-              <a:rPr lang="en-US" dirty="0">
-                <a:solidFill>
-                  <a:schemeClr val="bg1"/>
-                </a:solidFill>
-              </a:rPr>
-              <a:t>.</a:t>
-            </a:r>
-            <a:r>
-              <a:rPr lang="en-US" dirty="0"/>
-              <a:t> is context directory</a:t>
-            </a:r>
-          </a:p>
-          <a:p>
-            <a:pPr lvl="1"/>
-            <a:r>
-              <a:rPr lang="en-US" sz="1800" dirty="0" err="1">
+              <a:rPr lang="en-US" sz="2200" dirty="0"/>
+              <a:t>Right-click Docker icon in system tray &gt; Switch to Windows Containers</a:t>
+            </a:r>
+          </a:p>
+          <a:p>
+            <a:r>
+              <a:rPr lang="en-US" sz="1900" dirty="0" err="1">
                 <a:solidFill>
                   <a:schemeClr val="accent1"/>
                 </a:solidFill>
@@ -15954,7 +15424,7 @@
               <a:t>docker</a:t>
             </a:r>
             <a:r>
-              <a:rPr lang="en-US" sz="1800" dirty="0">
+              <a:rPr lang="en-US" sz="1900" dirty="0">
                 <a:solidFill>
                   <a:schemeClr val="accent1"/>
                 </a:solidFill>
@@ -15963,65 +15433,67 @@
                 </a:highlight>
                 <a:latin typeface="Consolas" panose="020B0609020204030204" pitchFamily="49" charset="0"/>
               </a:rPr>
-              <a:t> build -t aspnet-core-website1 .</a:t>
-            </a:r>
-          </a:p>
-          <a:p>
-            <a:r>
-              <a:rPr lang="en-US" sz="2000" dirty="0"/>
-              <a:t>Run Image as new Container</a:t>
-            </a:r>
-          </a:p>
-          <a:p>
-            <a:pPr lvl="1"/>
-            <a:r>
-              <a:rPr lang="en-US" sz="1800" dirty="0">
-                <a:solidFill>
-                  <a:schemeClr val="bg1"/>
-                </a:solidFill>
+              <a:t> pull </a:t>
+            </a:r>
+            <a:r>
+              <a:rPr lang="en-US" sz="1900" dirty="0" err="1">
+                <a:solidFill>
+                  <a:schemeClr val="accent1"/>
+                </a:solidFill>
+                <a:highlight>
+                  <a:srgbClr val="000000"/>
+                </a:highlight>
+                <a:latin typeface="Consolas" panose="020B0609020204030204" pitchFamily="49" charset="0"/>
               </a:rPr>
-              <a:t>-d</a:t>
-            </a:r>
-            <a:r>
-              <a:rPr lang="en-US" sz="1800" dirty="0"/>
-              <a:t> runs as daemon in the background</a:t>
-            </a:r>
-          </a:p>
-          <a:p>
-            <a:pPr lvl="1"/>
-            <a:r>
-              <a:rPr lang="en-US" sz="1800" dirty="0">
-                <a:solidFill>
-                  <a:schemeClr val="bg1"/>
-                </a:solidFill>
+              <a:t>microsoft</a:t>
+            </a:r>
+            <a:r>
+              <a:rPr lang="en-US" sz="1900" dirty="0">
+                <a:solidFill>
+                  <a:schemeClr val="accent1"/>
+                </a:solidFill>
+                <a:highlight>
+                  <a:srgbClr val="000000"/>
+                </a:highlight>
+                <a:latin typeface="Consolas" panose="020B0609020204030204" pitchFamily="49" charset="0"/>
               </a:rPr>
-              <a:t>-p</a:t>
-            </a:r>
-            <a:r>
-              <a:rPr lang="en-US" sz="1800" dirty="0"/>
-              <a:t> maps external to internal ports</a:t>
-            </a:r>
-          </a:p>
-          <a:p>
-            <a:pPr lvl="1"/>
-            <a:r>
-              <a:rPr lang="en-US" sz="1800" dirty="0">
-                <a:solidFill>
-                  <a:schemeClr val="bg1"/>
-                </a:solidFill>
+              <a:t>/</a:t>
+            </a:r>
+            <a:r>
+              <a:rPr lang="en-US" sz="1900" dirty="0" err="1">
+                <a:solidFill>
+                  <a:schemeClr val="accent1"/>
+                </a:solidFill>
+                <a:highlight>
+                  <a:srgbClr val="000000"/>
+                </a:highlight>
+                <a:latin typeface="Consolas" panose="020B0609020204030204" pitchFamily="49" charset="0"/>
               </a:rPr>
-              <a:t>--name</a:t>
-            </a:r>
-            <a:r>
-              <a:rPr lang="en-US" sz="1800" dirty="0"/>
-              <a:t> is container name</a:t>
-            </a:r>
-            <a:endParaRPr lang="en-US" sz="1600" dirty="0"/>
-          </a:p>
-          <a:p>
-            <a:pPr lvl="1"/>
-            <a:r>
-              <a:rPr lang="en-US" sz="1700" dirty="0" err="1">
+              <a:t>nanoserver</a:t>
+            </a:r>
+            <a:r>
+              <a:rPr lang="en-US" sz="1900" dirty="0">
+                <a:solidFill>
+                  <a:schemeClr val="accent1"/>
+                </a:solidFill>
+                <a:latin typeface="Consolas" panose="020B0609020204030204" pitchFamily="49" charset="0"/>
+              </a:rPr>
+              <a:t> </a:t>
+            </a:r>
+            <a:r>
+              <a:rPr lang="en-US" sz="1900" dirty="0"/>
+              <a:t>(pull down image)</a:t>
+            </a:r>
+            <a:endParaRPr lang="en-US" sz="1900" dirty="0">
+              <a:solidFill>
+                <a:schemeClr val="accent1"/>
+              </a:solidFill>
+              <a:latin typeface="Consolas" panose="020B0609020204030204" pitchFamily="49" charset="0"/>
+            </a:endParaRPr>
+          </a:p>
+          <a:p>
+            <a:r>
+              <a:rPr lang="en-US" sz="1900" dirty="0" err="1">
                 <a:solidFill>
                   <a:schemeClr val="accent1"/>
                 </a:solidFill>
@@ -16033,7 +15505,7 @@
               <a:t>docker</a:t>
             </a:r>
             <a:r>
-              <a:rPr lang="en-US" sz="1700" dirty="0">
+              <a:rPr lang="en-US" sz="1900" dirty="0">
                 <a:solidFill>
                   <a:schemeClr val="accent1"/>
                 </a:solidFill>
@@ -16042,10 +15514,10 @@
                 </a:highlight>
                 <a:latin typeface="Consolas" panose="020B0609020204030204" pitchFamily="49" charset="0"/>
               </a:rPr>
-              <a:t> run -d -p 5000:5000 --name aspnet-core-website1 </a:t>
-            </a:r>
-            <a:r>
-              <a:rPr lang="en-US" sz="1700" dirty="0" err="1">
+              <a:t> run -it </a:t>
+            </a:r>
+            <a:r>
+              <a:rPr lang="en-US" sz="1900" dirty="0" err="1">
                 <a:solidFill>
                   <a:schemeClr val="accent1"/>
                 </a:solidFill>
@@ -16054,9 +15526,175 @@
                 </a:highlight>
                 <a:latin typeface="Consolas" panose="020B0609020204030204" pitchFamily="49" charset="0"/>
               </a:rPr>
-              <a:t>aspnet-core-website1</a:t>
-            </a:r>
-            <a:endParaRPr lang="en-US" sz="1700" dirty="0">
+              <a:t>microsoft</a:t>
+            </a:r>
+            <a:r>
+              <a:rPr lang="en-US" sz="1900" dirty="0">
+                <a:solidFill>
+                  <a:schemeClr val="accent1"/>
+                </a:solidFill>
+                <a:highlight>
+                  <a:srgbClr val="000000"/>
+                </a:highlight>
+                <a:latin typeface="Consolas" panose="020B0609020204030204" pitchFamily="49" charset="0"/>
+              </a:rPr>
+              <a:t>/</a:t>
+            </a:r>
+            <a:r>
+              <a:rPr lang="en-US" sz="1900" dirty="0" err="1">
+                <a:solidFill>
+                  <a:schemeClr val="accent1"/>
+                </a:solidFill>
+                <a:highlight>
+                  <a:srgbClr val="000000"/>
+                </a:highlight>
+                <a:latin typeface="Consolas" panose="020B0609020204030204" pitchFamily="49" charset="0"/>
+              </a:rPr>
+              <a:t>nanoserver</a:t>
+            </a:r>
+            <a:r>
+              <a:rPr lang="en-US" sz="1900" dirty="0">
+                <a:solidFill>
+                  <a:schemeClr val="accent1"/>
+                </a:solidFill>
+                <a:highlight>
+                  <a:srgbClr val="000000"/>
+                </a:highlight>
+                <a:latin typeface="Consolas" panose="020B0609020204030204" pitchFamily="49" charset="0"/>
+              </a:rPr>
+              <a:t> </a:t>
+            </a:r>
+            <a:r>
+              <a:rPr lang="en-US" sz="1900" dirty="0" err="1">
+                <a:solidFill>
+                  <a:schemeClr val="accent1"/>
+                </a:solidFill>
+                <a:highlight>
+                  <a:srgbClr val="000000"/>
+                </a:highlight>
+                <a:latin typeface="Consolas" panose="020B0609020204030204" pitchFamily="49" charset="0"/>
+              </a:rPr>
+              <a:t>cmd</a:t>
+            </a:r>
+            <a:r>
+              <a:rPr lang="en-US" sz="1900" dirty="0">
+                <a:solidFill>
+                  <a:schemeClr val="accent1"/>
+                </a:solidFill>
+                <a:latin typeface="Consolas" panose="020B0609020204030204" pitchFamily="49" charset="0"/>
+              </a:rPr>
+              <a:t> </a:t>
+            </a:r>
+            <a:r>
+              <a:rPr lang="en-US" sz="1900" dirty="0"/>
+              <a:t>(run command inside image)</a:t>
+            </a:r>
+            <a:endParaRPr lang="en-US" sz="1900" dirty="0">
+              <a:solidFill>
+                <a:schemeClr val="accent1"/>
+              </a:solidFill>
+              <a:latin typeface="Consolas" panose="020B0609020204030204" pitchFamily="49" charset="0"/>
+            </a:endParaRPr>
+          </a:p>
+          <a:p>
+            <a:pPr lvl="1"/>
+            <a:r>
+              <a:rPr lang="en-US" sz="1500" dirty="0">
+                <a:highlight>
+                  <a:srgbClr val="000000"/>
+                </a:highlight>
+                <a:latin typeface="Consolas" panose="020B0609020204030204" pitchFamily="49" charset="0"/>
+              </a:rPr>
+              <a:t>powershell.exe Add-Content C:\helloworld.ps1 'Write-Host "Hello World from </a:t>
+            </a:r>
+            <a:r>
+              <a:rPr lang="en-US" sz="1500" dirty="0" err="1">
+                <a:highlight>
+                  <a:srgbClr val="000000"/>
+                </a:highlight>
+                <a:latin typeface="Consolas" panose="020B0609020204030204" pitchFamily="49" charset="0"/>
+              </a:rPr>
+              <a:t>Powershell</a:t>
+            </a:r>
+            <a:r>
+              <a:rPr lang="en-US" sz="1500" dirty="0">
+                <a:highlight>
+                  <a:srgbClr val="000000"/>
+                </a:highlight>
+                <a:latin typeface="Consolas" panose="020B0609020204030204" pitchFamily="49" charset="0"/>
+              </a:rPr>
+              <a:t>"'</a:t>
+            </a:r>
+          </a:p>
+          <a:p>
+            <a:pPr lvl="1"/>
+            <a:r>
+              <a:rPr lang="en-US" sz="1500" dirty="0">
+                <a:highlight>
+                  <a:srgbClr val="000000"/>
+                </a:highlight>
+                <a:latin typeface="Consolas" panose="020B0609020204030204" pitchFamily="49" charset="0"/>
+              </a:rPr>
+              <a:t>exit</a:t>
+            </a:r>
+            <a:endParaRPr lang="en-US" sz="1900" dirty="0">
+              <a:highlight>
+                <a:srgbClr val="000000"/>
+              </a:highlight>
+              <a:latin typeface="Consolas" panose="020B0609020204030204" pitchFamily="49" charset="0"/>
+            </a:endParaRPr>
+          </a:p>
+          <a:p>
+            <a:r>
+              <a:rPr lang="en-US" sz="1900" dirty="0" err="1">
+                <a:solidFill>
+                  <a:schemeClr val="accent1"/>
+                </a:solidFill>
+                <a:highlight>
+                  <a:srgbClr val="000000"/>
+                </a:highlight>
+                <a:latin typeface="Consolas" panose="020B0609020204030204" pitchFamily="49" charset="0"/>
+              </a:rPr>
+              <a:t>docker</a:t>
+            </a:r>
+            <a:r>
+              <a:rPr lang="en-US" sz="1900" dirty="0">
+                <a:solidFill>
+                  <a:schemeClr val="accent1"/>
+                </a:solidFill>
+                <a:highlight>
+                  <a:srgbClr val="000000"/>
+                </a:highlight>
+                <a:latin typeface="Consolas" panose="020B0609020204030204" pitchFamily="49" charset="0"/>
+              </a:rPr>
+              <a:t> commit {container hash} </a:t>
+            </a:r>
+            <a:r>
+              <a:rPr lang="en-US" sz="1900" dirty="0" err="1">
+                <a:solidFill>
+                  <a:schemeClr val="accent1"/>
+                </a:solidFill>
+                <a:highlight>
+                  <a:srgbClr val="000000"/>
+                </a:highlight>
+                <a:latin typeface="Consolas" panose="020B0609020204030204" pitchFamily="49" charset="0"/>
+              </a:rPr>
+              <a:t>helloworld</a:t>
+            </a:r>
+            <a:r>
+              <a:rPr lang="en-US" sz="1900" dirty="0">
+                <a:solidFill>
+                  <a:schemeClr val="accent1"/>
+                </a:solidFill>
+                <a:latin typeface="Consolas" panose="020B0609020204030204" pitchFamily="49" charset="0"/>
+              </a:rPr>
+              <a:t> </a:t>
+            </a:r>
+            <a:r>
+              <a:rPr lang="en-US" sz="1900" dirty="0"/>
+              <a:t>(stores changes as new image)</a:t>
+            </a:r>
+            <a:endParaRPr lang="en-US" sz="1900" dirty="0">
               <a:solidFill>
                 <a:schemeClr val="accent1"/>
               </a:solidFill>
@@ -16067,18 +15705,166 @@
             </a:endParaRPr>
           </a:p>
           <a:p>
+            <a:r>
+              <a:rPr lang="en-US" sz="1900" dirty="0" err="1">
+                <a:solidFill>
+                  <a:schemeClr val="accent1"/>
+                </a:solidFill>
+                <a:highlight>
+                  <a:srgbClr val="000000"/>
+                </a:highlight>
+                <a:latin typeface="Consolas" panose="020B0609020204030204" pitchFamily="49" charset="0"/>
+              </a:rPr>
+              <a:t>docker</a:t>
+            </a:r>
+            <a:r>
+              <a:rPr lang="en-US" sz="1900" dirty="0">
+                <a:solidFill>
+                  <a:schemeClr val="accent1"/>
+                </a:solidFill>
+                <a:highlight>
+                  <a:srgbClr val="000000"/>
+                </a:highlight>
+                <a:latin typeface="Consolas" panose="020B0609020204030204" pitchFamily="49" charset="0"/>
+              </a:rPr>
+              <a:t> run --</a:t>
+            </a:r>
+            <a:r>
+              <a:rPr lang="en-US" sz="1900" dirty="0" err="1">
+                <a:solidFill>
+                  <a:schemeClr val="accent1"/>
+                </a:solidFill>
+                <a:highlight>
+                  <a:srgbClr val="000000"/>
+                </a:highlight>
+                <a:latin typeface="Consolas" panose="020B0609020204030204" pitchFamily="49" charset="0"/>
+              </a:rPr>
+              <a:t>rm</a:t>
+            </a:r>
+            <a:r>
+              <a:rPr lang="en-US" sz="1900" dirty="0">
+                <a:solidFill>
+                  <a:schemeClr val="accent1"/>
+                </a:solidFill>
+                <a:highlight>
+                  <a:srgbClr val="000000"/>
+                </a:highlight>
+                <a:latin typeface="Consolas" panose="020B0609020204030204" pitchFamily="49" charset="0"/>
+              </a:rPr>
+              <a:t> </a:t>
+            </a:r>
+            <a:r>
+              <a:rPr lang="en-US" sz="1900" dirty="0" err="1">
+                <a:solidFill>
+                  <a:schemeClr val="accent1"/>
+                </a:solidFill>
+                <a:highlight>
+                  <a:srgbClr val="000000"/>
+                </a:highlight>
+                <a:latin typeface="Consolas" panose="020B0609020204030204" pitchFamily="49" charset="0"/>
+              </a:rPr>
+              <a:t>helloworld</a:t>
+            </a:r>
+            <a:r>
+              <a:rPr lang="en-US" sz="1900" dirty="0">
+                <a:solidFill>
+                  <a:schemeClr val="accent1"/>
+                </a:solidFill>
+                <a:highlight>
+                  <a:srgbClr val="000000"/>
+                </a:highlight>
+                <a:latin typeface="Consolas" panose="020B0609020204030204" pitchFamily="49" charset="0"/>
+              </a:rPr>
+              <a:t> </a:t>
+            </a:r>
+            <a:r>
+              <a:rPr lang="en-US" sz="1900" dirty="0" err="1">
+                <a:solidFill>
+                  <a:schemeClr val="accent1"/>
+                </a:solidFill>
+                <a:highlight>
+                  <a:srgbClr val="000000"/>
+                </a:highlight>
+                <a:latin typeface="Consolas" panose="020B0609020204030204" pitchFamily="49" charset="0"/>
+              </a:rPr>
+              <a:t>powershell</a:t>
+            </a:r>
+            <a:r>
+              <a:rPr lang="en-US" sz="1900" dirty="0">
+                <a:solidFill>
+                  <a:schemeClr val="accent1"/>
+                </a:solidFill>
+                <a:highlight>
+                  <a:srgbClr val="000000"/>
+                </a:highlight>
+                <a:latin typeface="Consolas" panose="020B0609020204030204" pitchFamily="49" charset="0"/>
+              </a:rPr>
+              <a:t> c:\helloworld.ps1</a:t>
+            </a:r>
+          </a:p>
+          <a:p>
             <a:pPr lvl="1"/>
             <a:r>
-              <a:rPr lang="en-US" sz="1700" dirty="0"/>
-              <a:t>http://localhost:5000/</a:t>
-            </a:r>
+              <a:rPr lang="en-US" sz="2200" dirty="0"/>
+              <a:t>Note the </a:t>
+            </a:r>
+            <a:r>
+              <a:rPr lang="en-US" sz="1500" dirty="0">
+                <a:solidFill>
+                  <a:schemeClr val="accent1"/>
+                </a:solidFill>
+                <a:highlight>
+                  <a:srgbClr val="000000"/>
+                </a:highlight>
+                <a:latin typeface="Consolas" panose="020B0609020204030204" pitchFamily="49" charset="0"/>
+              </a:rPr>
+              <a:t>--</a:t>
+            </a:r>
+            <a:r>
+              <a:rPr lang="en-US" sz="1500" dirty="0" err="1">
+                <a:solidFill>
+                  <a:schemeClr val="accent1"/>
+                </a:solidFill>
+                <a:highlight>
+                  <a:srgbClr val="000000"/>
+                </a:highlight>
+                <a:latin typeface="Consolas" panose="020B0609020204030204" pitchFamily="49" charset="0"/>
+              </a:rPr>
+              <a:t>rm</a:t>
+            </a:r>
+            <a:r>
+              <a:rPr lang="en-US" sz="2200" dirty="0"/>
+              <a:t> removes the container when it has completed</a:t>
+            </a:r>
+          </a:p>
+          <a:p>
+            <a:endParaRPr lang="en-US" dirty="0"/>
+          </a:p>
+          <a:p>
+            <a:pPr marL="0" indent="0">
+              <a:buNone/>
+            </a:pPr>
+            <a:r>
+              <a:rPr lang="en-US" sz="1600" dirty="0"/>
+              <a:t>Source: </a:t>
+            </a:r>
+            <a:r>
+              <a:rPr lang="en-US" sz="1600" dirty="0">
+                <a:hlinkClick r:id="rId2"/>
+              </a:rPr>
+              <a:t>https://msdn.microsoft.com/en-us/virtualization/windowscontainers/quick_start/quick_start_windows_10</a:t>
+            </a:r>
+            <a:endParaRPr lang="en-US" sz="1600" dirty="0"/>
+          </a:p>
+          <a:p>
+            <a:endParaRPr lang="en-US" dirty="0"/>
           </a:p>
         </p:txBody>
       </p:sp>
     </p:spTree>
     <p:extLst>
       <p:ext uri="{BB962C8B-B14F-4D97-AF65-F5344CB8AC3E}">
-        <p14:creationId xmlns:p14="http://schemas.microsoft.com/office/powerpoint/2010/main" val="3140673228"/>
+        <p14:creationId xmlns:p14="http://schemas.microsoft.com/office/powerpoint/2010/main" val="1721733695"/>
       </p:ext>
     </p:extLst>
   </p:cSld>

</xml_diff>